<commit_message>
Added use cases and updated PPT file
</commit_message>
<xml_diff>
--- a/doc/Presentation File.pptx
+++ b/doc/Presentation File.pptx
@@ -6,11 +6,16 @@
   </p:sldMasterIdLst>
   <p:sldIdLst>
     <p:sldId id="256" r:id="rId2"/>
-    <p:sldId id="262" r:id="rId3"/>
-    <p:sldId id="259" r:id="rId4"/>
-    <p:sldId id="260" r:id="rId5"/>
-    <p:sldId id="257" r:id="rId6"/>
-    <p:sldId id="258" r:id="rId7"/>
+    <p:sldId id="266" r:id="rId3"/>
+    <p:sldId id="267" r:id="rId4"/>
+    <p:sldId id="265" r:id="rId5"/>
+    <p:sldId id="263" r:id="rId6"/>
+    <p:sldId id="264" r:id="rId7"/>
+    <p:sldId id="262" r:id="rId8"/>
+    <p:sldId id="259" r:id="rId9"/>
+    <p:sldId id="260" r:id="rId10"/>
+    <p:sldId id="257" r:id="rId11"/>
+    <p:sldId id="258" r:id="rId12"/>
   </p:sldIdLst>
   <p:sldSz cx="9144000" cy="6858000" type="screen4x3"/>
   <p:notesSz cx="6858000" cy="9144000"/>
@@ -109,6 +114,11 @@
       </a:defRPr>
     </a:lvl9pPr>
   </p:defaultTextStyle>
+  <p:extLst>
+    <p:ext uri="{EFAFB233-063F-42B5-8137-9DF3F51BA10A}">
+      <p15:sldGuideLst xmlns:p15="http://schemas.microsoft.com/office/powerpoint/2012/main"/>
+    </p:ext>
+  </p:extLst>
 </p:presentation>
 </file>
 
@@ -243,7 +253,7 @@
           <a:p>
             <a:fld id="{0B04DA48-9DE3-4C72-B7B0-42DB123C9C64}" type="datetimeFigureOut">
               <a:rPr lang="en-US" smtClean="0"/>
-              <a:t>10/14/2023</a:t>
+              <a:t>10/15/2023</a:t>
             </a:fld>
             <a:endParaRPr lang="en-US"/>
           </a:p>
@@ -413,7 +423,7 @@
           <a:p>
             <a:fld id="{0B04DA48-9DE3-4C72-B7B0-42DB123C9C64}" type="datetimeFigureOut">
               <a:rPr lang="en-US" smtClean="0"/>
-              <a:t>10/14/2023</a:t>
+              <a:t>10/15/2023</a:t>
             </a:fld>
             <a:endParaRPr lang="en-US"/>
           </a:p>
@@ -593,7 +603,7 @@
           <a:p>
             <a:fld id="{0B04DA48-9DE3-4C72-B7B0-42DB123C9C64}" type="datetimeFigureOut">
               <a:rPr lang="en-US" smtClean="0"/>
-              <a:t>10/14/2023</a:t>
+              <a:t>10/15/2023</a:t>
             </a:fld>
             <a:endParaRPr lang="en-US"/>
           </a:p>
@@ -763,7 +773,7 @@
           <a:p>
             <a:fld id="{0B04DA48-9DE3-4C72-B7B0-42DB123C9C64}" type="datetimeFigureOut">
               <a:rPr lang="en-US" smtClean="0"/>
-              <a:t>10/14/2023</a:t>
+              <a:t>10/15/2023</a:t>
             </a:fld>
             <a:endParaRPr lang="en-US"/>
           </a:p>
@@ -1009,7 +1019,7 @@
           <a:p>
             <a:fld id="{0B04DA48-9DE3-4C72-B7B0-42DB123C9C64}" type="datetimeFigureOut">
               <a:rPr lang="en-US" smtClean="0"/>
-              <a:t>10/14/2023</a:t>
+              <a:t>10/15/2023</a:t>
             </a:fld>
             <a:endParaRPr lang="en-US"/>
           </a:p>
@@ -1241,7 +1251,7 @@
           <a:p>
             <a:fld id="{0B04DA48-9DE3-4C72-B7B0-42DB123C9C64}" type="datetimeFigureOut">
               <a:rPr lang="en-US" smtClean="0"/>
-              <a:t>10/14/2023</a:t>
+              <a:t>10/15/2023</a:t>
             </a:fld>
             <a:endParaRPr lang="en-US"/>
           </a:p>
@@ -1608,7 +1618,7 @@
           <a:p>
             <a:fld id="{0B04DA48-9DE3-4C72-B7B0-42DB123C9C64}" type="datetimeFigureOut">
               <a:rPr lang="en-US" smtClean="0"/>
-              <a:t>10/14/2023</a:t>
+              <a:t>10/15/2023</a:t>
             </a:fld>
             <a:endParaRPr lang="en-US"/>
           </a:p>
@@ -1726,7 +1736,7 @@
           <a:p>
             <a:fld id="{0B04DA48-9DE3-4C72-B7B0-42DB123C9C64}" type="datetimeFigureOut">
               <a:rPr lang="en-US" smtClean="0"/>
-              <a:t>10/14/2023</a:t>
+              <a:t>10/15/2023</a:t>
             </a:fld>
             <a:endParaRPr lang="en-US"/>
           </a:p>
@@ -1821,7 +1831,7 @@
           <a:p>
             <a:fld id="{0B04DA48-9DE3-4C72-B7B0-42DB123C9C64}" type="datetimeFigureOut">
               <a:rPr lang="en-US" smtClean="0"/>
-              <a:t>10/14/2023</a:t>
+              <a:t>10/15/2023</a:t>
             </a:fld>
             <a:endParaRPr lang="en-US"/>
           </a:p>
@@ -2098,7 +2108,7 @@
           <a:p>
             <a:fld id="{0B04DA48-9DE3-4C72-B7B0-42DB123C9C64}" type="datetimeFigureOut">
               <a:rPr lang="en-US" smtClean="0"/>
-              <a:t>10/14/2023</a:t>
+              <a:t>10/15/2023</a:t>
             </a:fld>
             <a:endParaRPr lang="en-US"/>
           </a:p>
@@ -2351,7 +2361,7 @@
           <a:p>
             <a:fld id="{0B04DA48-9DE3-4C72-B7B0-42DB123C9C64}" type="datetimeFigureOut">
               <a:rPr lang="en-US" smtClean="0"/>
-              <a:t>10/14/2023</a:t>
+              <a:t>10/15/2023</a:t>
             </a:fld>
             <a:endParaRPr lang="en-US"/>
           </a:p>
@@ -2564,7 +2574,7 @@
           <a:p>
             <a:fld id="{0B04DA48-9DE3-4C72-B7B0-42DB123C9C64}" type="datetimeFigureOut">
               <a:rPr lang="en-US" smtClean="0"/>
-              <a:t>10/14/2023</a:t>
+              <a:t>10/15/2023</a:t>
             </a:fld>
             <a:endParaRPr lang="en-US"/>
           </a:p>
@@ -3029,7 +3039,25 @@
                 </a:solidFill>
                 <a:latin typeface="Arial Black" panose="020B0A04020102020204" pitchFamily="34" charset="0"/>
               </a:rPr>
-              <a:t>Project Title: Library Management System</a:t>
+              <a:t>Project </a:t>
+            </a:r>
+            <a:r>
+              <a:rPr lang="en-US" sz="2800" b="1" dirty="0" smtClean="0">
+                <a:solidFill>
+                  <a:srgbClr val="000000"/>
+                </a:solidFill>
+                <a:latin typeface="Arial Black" panose="020B0A04020102020204" pitchFamily="34" charset="0"/>
+              </a:rPr>
+              <a:t>: </a:t>
+            </a:r>
+            <a:r>
+              <a:rPr lang="en-US" sz="2800" b="1" dirty="0" smtClean="0">
+                <a:solidFill>
+                  <a:srgbClr val="000000"/>
+                </a:solidFill>
+                <a:latin typeface="Arial Black" panose="020B0A04020102020204" pitchFamily="34" charset="0"/>
+              </a:rPr>
+              <a:t>Library Management System</a:t>
             </a:r>
             <a:r>
               <a:rPr lang="en-US" sz="2400" b="1" dirty="0" smtClean="0">
@@ -3546,6 +3574,440 @@
 </p:sld>
 </file>
 
+<file path=ppt/slides/slide10.xml><?xml version="1.0" encoding="utf-8"?>
+<p:sld xmlns:a="http://schemas.openxmlformats.org/drawingml/2006/main" xmlns:r="http://schemas.openxmlformats.org/officeDocument/2006/relationships" xmlns:p="http://schemas.openxmlformats.org/presentationml/2006/main">
+  <p:cSld>
+    <p:spTree>
+      <p:nvGrpSpPr>
+        <p:cNvPr id="1" name=""/>
+        <p:cNvGrpSpPr/>
+        <p:nvPr/>
+      </p:nvGrpSpPr>
+      <p:grpSpPr>
+        <a:xfrm>
+          <a:off x="0" y="0"/>
+          <a:ext cx="0" cy="0"/>
+          <a:chOff x="0" y="0"/>
+          <a:chExt cx="0" cy="0"/>
+        </a:xfrm>
+      </p:grpSpPr>
+      <p:sp>
+        <p:nvSpPr>
+          <p:cNvPr id="2" name="Title 1"/>
+          <p:cNvSpPr>
+            <a:spLocks noGrp="1"/>
+          </p:cNvSpPr>
+          <p:nvPr>
+            <p:ph type="title"/>
+          </p:nvPr>
+        </p:nvSpPr>
+        <p:spPr>
+          <a:xfrm>
+            <a:off x="287383" y="8706"/>
+            <a:ext cx="8699863" cy="1464266"/>
+          </a:xfrm>
+        </p:spPr>
+        <p:txBody>
+          <a:bodyPr/>
+          <a:lstStyle/>
+          <a:p>
+            <a:pPr algn="ctr">
+              <a:lnSpc>
+                <a:spcPct val="120000"/>
+              </a:lnSpc>
+            </a:pPr>
+            <a:r>
+              <a:rPr lang="en-US" sz="3200" b="1" dirty="0" smtClean="0">
+                <a:solidFill>
+                  <a:srgbClr val="000000"/>
+                </a:solidFill>
+                <a:latin typeface="Times New Roman" panose="02020603050405020304" pitchFamily="18" charset="0"/>
+                <a:cs typeface="Times New Roman" panose="02020603050405020304" pitchFamily="18" charset="0"/>
+              </a:rPr>
+              <a:t>Connecting the Parts of Knowledge With the Wholeness of Knowledge</a:t>
+            </a:r>
+            <a:endParaRPr lang="en-US" b="1" dirty="0">
+              <a:solidFill>
+                <a:srgbClr val="000000"/>
+              </a:solidFill>
+              <a:latin typeface="Times New Roman" panose="02020603050405020304" pitchFamily="18" charset="0"/>
+              <a:cs typeface="Times New Roman" panose="02020603050405020304" pitchFamily="18" charset="0"/>
+            </a:endParaRPr>
+          </a:p>
+        </p:txBody>
+      </p:sp>
+      <p:sp>
+        <p:nvSpPr>
+          <p:cNvPr id="3" name="Content Placeholder 2"/>
+          <p:cNvSpPr>
+            <a:spLocks noGrp="1"/>
+          </p:cNvSpPr>
+          <p:nvPr>
+            <p:ph idx="1"/>
+          </p:nvPr>
+        </p:nvSpPr>
+        <p:spPr>
+          <a:xfrm>
+            <a:off x="628650" y="1454324"/>
+            <a:ext cx="7886700" cy="1881052"/>
+          </a:xfrm>
+        </p:spPr>
+        <p:txBody>
+          <a:bodyPr/>
+          <a:lstStyle/>
+          <a:p>
+            <a:pPr algn="just"/>
+            <a:r>
+              <a:rPr lang="en-US" dirty="0" smtClean="0"/>
+              <a:t>Our developed library management system is built in layers and modules. Business, Data, Data access and library-system (UI) all together forms the library management System. </a:t>
+            </a:r>
+          </a:p>
+          <a:p>
+            <a:pPr algn="just">
+              <a:buClr>
+                <a:srgbClr val="0070C0"/>
+              </a:buClr>
+            </a:pPr>
+            <a:r>
+              <a:rPr lang="en-US" dirty="0" smtClean="0"/>
+              <a:t>In real world Life is found in Layers. Different layers of life interact with each other to create the physical structures. </a:t>
+            </a:r>
+            <a:endParaRPr lang="en-US" dirty="0"/>
+          </a:p>
+        </p:txBody>
+      </p:sp>
+      <p:cxnSp>
+        <p:nvCxnSpPr>
+          <p:cNvPr id="4" name="Straight Connector 4"/>
+          <p:cNvCxnSpPr>
+            <a:cxnSpLocks noChangeShapeType="1"/>
+          </p:cNvCxnSpPr>
+          <p:nvPr/>
+        </p:nvCxnSpPr>
+        <p:spPr bwMode="auto">
+          <a:xfrm>
+            <a:off x="840376" y="3187329"/>
+            <a:ext cx="7593875" cy="0"/>
+          </a:xfrm>
+          <a:prstGeom prst="line">
+            <a:avLst/>
+          </a:prstGeom>
+          <a:noFill/>
+          <a:ln w="19050" algn="ctr">
+            <a:solidFill>
+              <a:schemeClr val="tx1"/>
+            </a:solidFill>
+            <a:round/>
+            <a:headEnd/>
+            <a:tailEnd/>
+          </a:ln>
+        </p:spPr>
+      </p:cxnSp>
+      <p:sp>
+        <p:nvSpPr>
+          <p:cNvPr id="5" name="Content Placeholder 2"/>
+          <p:cNvSpPr txBox="1">
+            <a:spLocks/>
+          </p:cNvSpPr>
+          <p:nvPr/>
+        </p:nvSpPr>
+        <p:spPr>
+          <a:xfrm>
+            <a:off x="693963" y="3274419"/>
+            <a:ext cx="7886700" cy="3378929"/>
+          </a:xfrm>
+          <a:prstGeom prst="rect">
+            <a:avLst/>
+          </a:prstGeom>
+        </p:spPr>
+        <p:txBody>
+          <a:bodyPr vert="horz" lIns="91440" tIns="45720" rIns="91440" bIns="45720" rtlCol="0">
+            <a:noAutofit/>
+          </a:bodyPr>
+          <a:lstStyle>
+            <a:lvl1pPr marL="171450" indent="-171450" algn="l" defTabSz="685800" rtl="0" eaLnBrk="1" latinLnBrk="0" hangingPunct="1">
+              <a:lnSpc>
+                <a:spcPct val="90000"/>
+              </a:lnSpc>
+              <a:spcBef>
+                <a:spcPts val="750"/>
+              </a:spcBef>
+              <a:buFont typeface="Arial" panose="020B0604020202020204" pitchFamily="34" charset="0"/>
+              <a:buChar char="•"/>
+              <a:defRPr sz="2100" kern="1200">
+                <a:solidFill>
+                  <a:schemeClr val="tx1"/>
+                </a:solidFill>
+                <a:latin typeface="+mn-lt"/>
+                <a:ea typeface="+mn-ea"/>
+                <a:cs typeface="+mn-cs"/>
+              </a:defRPr>
+            </a:lvl1pPr>
+            <a:lvl2pPr marL="514350" indent="-171450" algn="l" defTabSz="685800" rtl="0" eaLnBrk="1" latinLnBrk="0" hangingPunct="1">
+              <a:lnSpc>
+                <a:spcPct val="90000"/>
+              </a:lnSpc>
+              <a:spcBef>
+                <a:spcPts val="375"/>
+              </a:spcBef>
+              <a:buFont typeface="Arial" panose="020B0604020202020204" pitchFamily="34" charset="0"/>
+              <a:buChar char="•"/>
+              <a:defRPr sz="1800" kern="1200">
+                <a:solidFill>
+                  <a:schemeClr val="tx1"/>
+                </a:solidFill>
+                <a:latin typeface="+mn-lt"/>
+                <a:ea typeface="+mn-ea"/>
+                <a:cs typeface="+mn-cs"/>
+              </a:defRPr>
+            </a:lvl2pPr>
+            <a:lvl3pPr marL="857250" indent="-171450" algn="l" defTabSz="685800" rtl="0" eaLnBrk="1" latinLnBrk="0" hangingPunct="1">
+              <a:lnSpc>
+                <a:spcPct val="90000"/>
+              </a:lnSpc>
+              <a:spcBef>
+                <a:spcPts val="375"/>
+              </a:spcBef>
+              <a:buFont typeface="Arial" panose="020B0604020202020204" pitchFamily="34" charset="0"/>
+              <a:buChar char="•"/>
+              <a:defRPr sz="1500" kern="1200">
+                <a:solidFill>
+                  <a:schemeClr val="tx1"/>
+                </a:solidFill>
+                <a:latin typeface="+mn-lt"/>
+                <a:ea typeface="+mn-ea"/>
+                <a:cs typeface="+mn-cs"/>
+              </a:defRPr>
+            </a:lvl3pPr>
+            <a:lvl4pPr marL="1200150" indent="-171450" algn="l" defTabSz="685800" rtl="0" eaLnBrk="1" latinLnBrk="0" hangingPunct="1">
+              <a:lnSpc>
+                <a:spcPct val="90000"/>
+              </a:lnSpc>
+              <a:spcBef>
+                <a:spcPts val="375"/>
+              </a:spcBef>
+              <a:buFont typeface="Arial" panose="020B0604020202020204" pitchFamily="34" charset="0"/>
+              <a:buChar char="•"/>
+              <a:defRPr sz="1350" kern="1200">
+                <a:solidFill>
+                  <a:schemeClr val="tx1"/>
+                </a:solidFill>
+                <a:latin typeface="+mn-lt"/>
+                <a:ea typeface="+mn-ea"/>
+                <a:cs typeface="+mn-cs"/>
+              </a:defRPr>
+            </a:lvl4pPr>
+            <a:lvl5pPr marL="1543050" indent="-171450" algn="l" defTabSz="685800" rtl="0" eaLnBrk="1" latinLnBrk="0" hangingPunct="1">
+              <a:lnSpc>
+                <a:spcPct val="90000"/>
+              </a:lnSpc>
+              <a:spcBef>
+                <a:spcPts val="375"/>
+              </a:spcBef>
+              <a:buFont typeface="Arial" panose="020B0604020202020204" pitchFamily="34" charset="0"/>
+              <a:buChar char="•"/>
+              <a:defRPr sz="1350" kern="1200">
+                <a:solidFill>
+                  <a:schemeClr val="tx1"/>
+                </a:solidFill>
+                <a:latin typeface="+mn-lt"/>
+                <a:ea typeface="+mn-ea"/>
+                <a:cs typeface="+mn-cs"/>
+              </a:defRPr>
+            </a:lvl5pPr>
+            <a:lvl6pPr marL="1885950" indent="-171450" algn="l" defTabSz="685800" rtl="0" eaLnBrk="1" latinLnBrk="0" hangingPunct="1">
+              <a:lnSpc>
+                <a:spcPct val="90000"/>
+              </a:lnSpc>
+              <a:spcBef>
+                <a:spcPts val="375"/>
+              </a:spcBef>
+              <a:buFont typeface="Arial" panose="020B0604020202020204" pitchFamily="34" charset="0"/>
+              <a:buChar char="•"/>
+              <a:defRPr sz="1350" kern="1200">
+                <a:solidFill>
+                  <a:schemeClr val="tx1"/>
+                </a:solidFill>
+                <a:latin typeface="+mn-lt"/>
+                <a:ea typeface="+mn-ea"/>
+                <a:cs typeface="+mn-cs"/>
+              </a:defRPr>
+            </a:lvl6pPr>
+            <a:lvl7pPr marL="2228850" indent="-171450" algn="l" defTabSz="685800" rtl="0" eaLnBrk="1" latinLnBrk="0" hangingPunct="1">
+              <a:lnSpc>
+                <a:spcPct val="90000"/>
+              </a:lnSpc>
+              <a:spcBef>
+                <a:spcPts val="375"/>
+              </a:spcBef>
+              <a:buFont typeface="Arial" panose="020B0604020202020204" pitchFamily="34" charset="0"/>
+              <a:buChar char="•"/>
+              <a:defRPr sz="1350" kern="1200">
+                <a:solidFill>
+                  <a:schemeClr val="tx1"/>
+                </a:solidFill>
+                <a:latin typeface="+mn-lt"/>
+                <a:ea typeface="+mn-ea"/>
+                <a:cs typeface="+mn-cs"/>
+              </a:defRPr>
+            </a:lvl7pPr>
+            <a:lvl8pPr marL="2571750" indent="-171450" algn="l" defTabSz="685800" rtl="0" eaLnBrk="1" latinLnBrk="0" hangingPunct="1">
+              <a:lnSpc>
+                <a:spcPct val="90000"/>
+              </a:lnSpc>
+              <a:spcBef>
+                <a:spcPts val="375"/>
+              </a:spcBef>
+              <a:buFont typeface="Arial" panose="020B0604020202020204" pitchFamily="34" charset="0"/>
+              <a:buChar char="•"/>
+              <a:defRPr sz="1350" kern="1200">
+                <a:solidFill>
+                  <a:schemeClr val="tx1"/>
+                </a:solidFill>
+                <a:latin typeface="+mn-lt"/>
+                <a:ea typeface="+mn-ea"/>
+                <a:cs typeface="+mn-cs"/>
+              </a:defRPr>
+            </a:lvl8pPr>
+            <a:lvl9pPr marL="2914650" indent="-171450" algn="l" defTabSz="685800" rtl="0" eaLnBrk="1" latinLnBrk="0" hangingPunct="1">
+              <a:lnSpc>
+                <a:spcPct val="90000"/>
+              </a:lnSpc>
+              <a:spcBef>
+                <a:spcPts val="375"/>
+              </a:spcBef>
+              <a:buFont typeface="Arial" panose="020B0604020202020204" pitchFamily="34" charset="0"/>
+              <a:buChar char="•"/>
+              <a:defRPr sz="1350" kern="1200">
+                <a:solidFill>
+                  <a:schemeClr val="tx1"/>
+                </a:solidFill>
+                <a:latin typeface="+mn-lt"/>
+                <a:ea typeface="+mn-ea"/>
+                <a:cs typeface="+mn-cs"/>
+              </a:defRPr>
+            </a:lvl9pPr>
+          </a:lstStyle>
+          <a:p>
+            <a:pPr algn="just">
+              <a:lnSpc>
+                <a:spcPct val="110000"/>
+              </a:lnSpc>
+            </a:pPr>
+            <a:r>
+              <a:rPr lang="en-US" dirty="0"/>
+              <a:t>Different layers (Business, Data, Data access and library-system (UI)) of Library management system communicates with each other through function calls. Each layer interacts with the other through different techniques like Inheritance, Association, Composition etc. System data can be only accessed through UI.</a:t>
+            </a:r>
+          </a:p>
+          <a:p>
+            <a:pPr algn="just">
+              <a:lnSpc>
+                <a:spcPct val="110000"/>
+              </a:lnSpc>
+              <a:buClr>
+                <a:srgbClr val="0070C0"/>
+              </a:buClr>
+            </a:pPr>
+            <a:r>
+              <a:rPr lang="en-US" dirty="0"/>
+              <a:t>In Unity Consciousness, one feels intimately associated with all other things in creation as a result of perceiving all things in terms of one’s Self. The unified field can only be accessed through Transcendental Consciousness.</a:t>
+            </a:r>
+          </a:p>
+        </p:txBody>
+      </p:sp>
+    </p:spTree>
+    <p:extLst>
+      <p:ext uri="{BB962C8B-B14F-4D97-AF65-F5344CB8AC3E}">
+        <p14:creationId xmlns:p14="http://schemas.microsoft.com/office/powerpoint/2010/main" val="1158721665"/>
+      </p:ext>
+    </p:extLst>
+  </p:cSld>
+  <p:clrMapOvr>
+    <a:masterClrMapping/>
+  </p:clrMapOvr>
+  <p:timing>
+    <p:tnLst>
+      <p:par>
+        <p:cTn id="1" dur="indefinite" restart="never" nodeType="tmRoot"/>
+      </p:par>
+    </p:tnLst>
+  </p:timing>
+</p:sld>
+</file>
+
+<file path=ppt/slides/slide11.xml><?xml version="1.0" encoding="utf-8"?>
+<p:sld xmlns:a="http://schemas.openxmlformats.org/drawingml/2006/main" xmlns:r="http://schemas.openxmlformats.org/officeDocument/2006/relationships" xmlns:p="http://schemas.openxmlformats.org/presentationml/2006/main">
+  <p:cSld>
+    <p:spTree>
+      <p:nvGrpSpPr>
+        <p:cNvPr id="1" name=""/>
+        <p:cNvGrpSpPr/>
+        <p:nvPr/>
+      </p:nvGrpSpPr>
+      <p:grpSpPr>
+        <a:xfrm>
+          <a:off x="0" y="0"/>
+          <a:ext cx="0" cy="0"/>
+          <a:chOff x="0" y="0"/>
+          <a:chExt cx="0" cy="0"/>
+        </a:xfrm>
+      </p:grpSpPr>
+      <p:sp>
+        <p:nvSpPr>
+          <p:cNvPr id="2" name="Title 1"/>
+          <p:cNvSpPr>
+            <a:spLocks noGrp="1"/>
+          </p:cNvSpPr>
+          <p:nvPr>
+            <p:ph type="title"/>
+          </p:nvPr>
+        </p:nvSpPr>
+        <p:spPr>
+          <a:xfrm>
+            <a:off x="663485" y="2542269"/>
+            <a:ext cx="7886700" cy="1325563"/>
+          </a:xfrm>
+        </p:spPr>
+        <p:txBody>
+          <a:bodyPr>
+            <a:normAutofit/>
+          </a:bodyPr>
+          <a:lstStyle/>
+          <a:p>
+            <a:pPr algn="ctr"/>
+            <a:r>
+              <a:rPr lang="en-US" sz="3600" b="1" dirty="0" smtClean="0">
+                <a:solidFill>
+                  <a:schemeClr val="accent1">
+                    <a:lumMod val="75000"/>
+                  </a:schemeClr>
+                </a:solidFill>
+              </a:rPr>
+              <a:t>Thank You!</a:t>
+            </a:r>
+            <a:endParaRPr lang="en-US" sz="3600" b="1" dirty="0">
+              <a:solidFill>
+                <a:schemeClr val="accent1">
+                  <a:lumMod val="75000"/>
+                </a:schemeClr>
+              </a:solidFill>
+            </a:endParaRPr>
+          </a:p>
+        </p:txBody>
+      </p:sp>
+    </p:spTree>
+    <p:extLst>
+      <p:ext uri="{BB962C8B-B14F-4D97-AF65-F5344CB8AC3E}">
+        <p14:creationId xmlns:p14="http://schemas.microsoft.com/office/powerpoint/2010/main" val="3788890314"/>
+      </p:ext>
+    </p:extLst>
+  </p:cSld>
+  <p:clrMapOvr>
+    <a:masterClrMapping/>
+  </p:clrMapOvr>
+</p:sld>
+</file>
+
 <file path=ppt/slides/slide2.xml><?xml version="1.0" encoding="utf-8"?>
 <p:sld xmlns:a="http://schemas.openxmlformats.org/drawingml/2006/main" xmlns:r="http://schemas.openxmlformats.org/officeDocument/2006/relationships" xmlns:p="http://schemas.openxmlformats.org/presentationml/2006/main">
   <p:cSld>
@@ -3565,6 +4027,1188 @@
       </p:grpSpPr>
       <p:sp>
         <p:nvSpPr>
+          <p:cNvPr id="4" name="Title 1"/>
+          <p:cNvSpPr txBox="1">
+            <a:spLocks/>
+          </p:cNvSpPr>
+          <p:nvPr/>
+        </p:nvSpPr>
+        <p:spPr>
+          <a:xfrm>
+            <a:off x="628650" y="164828"/>
+            <a:ext cx="7886700" cy="845365"/>
+          </a:xfrm>
+          <a:prstGeom prst="rect">
+            <a:avLst/>
+          </a:prstGeom>
+        </p:spPr>
+        <p:txBody>
+          <a:bodyPr vert="horz" lIns="91440" tIns="45720" rIns="91440" bIns="45720" rtlCol="0" anchor="ctr">
+            <a:normAutofit fontScale="97500"/>
+          </a:bodyPr>
+          <a:lstStyle>
+            <a:lvl1pPr algn="l" defTabSz="685800" rtl="0" eaLnBrk="1" latinLnBrk="0" hangingPunct="1">
+              <a:lnSpc>
+                <a:spcPct val="90000"/>
+              </a:lnSpc>
+              <a:spcBef>
+                <a:spcPct val="0"/>
+              </a:spcBef>
+              <a:buNone/>
+              <a:defRPr sz="3300" kern="1200">
+                <a:solidFill>
+                  <a:schemeClr val="tx1"/>
+                </a:solidFill>
+                <a:latin typeface="+mj-lt"/>
+                <a:ea typeface="+mj-ea"/>
+                <a:cs typeface="+mj-cs"/>
+              </a:defRPr>
+            </a:lvl1pPr>
+          </a:lstStyle>
+          <a:p>
+            <a:pPr>
+              <a:lnSpc>
+                <a:spcPct val="120000"/>
+              </a:lnSpc>
+            </a:pPr>
+            <a:r>
+              <a:rPr lang="en-US" sz="3100" b="1" dirty="0" smtClean="0">
+                <a:latin typeface="Times New Roman" panose="02020603050405020304" pitchFamily="18" charset="0"/>
+                <a:cs typeface="Times New Roman" panose="02020603050405020304" pitchFamily="18" charset="0"/>
+              </a:rPr>
+              <a:t>Contents</a:t>
+            </a:r>
+            <a:endParaRPr lang="en-US" sz="3100" b="1" dirty="0">
+              <a:latin typeface="Times New Roman" panose="02020603050405020304" pitchFamily="18" charset="0"/>
+              <a:cs typeface="Times New Roman" panose="02020603050405020304" pitchFamily="18" charset="0"/>
+            </a:endParaRPr>
+          </a:p>
+        </p:txBody>
+      </p:sp>
+      <p:sp>
+        <p:nvSpPr>
+          <p:cNvPr id="5" name="Content Placeholder 2"/>
+          <p:cNvSpPr txBox="1">
+            <a:spLocks/>
+          </p:cNvSpPr>
+          <p:nvPr/>
+        </p:nvSpPr>
+        <p:spPr>
+          <a:xfrm>
+            <a:off x="628651" y="1010193"/>
+            <a:ext cx="8175716" cy="4351338"/>
+          </a:xfrm>
+          <a:prstGeom prst="rect">
+            <a:avLst/>
+          </a:prstGeom>
+        </p:spPr>
+        <p:txBody>
+          <a:bodyPr vert="horz" lIns="91440" tIns="45720" rIns="91440" bIns="45720" rtlCol="0">
+            <a:normAutofit/>
+          </a:bodyPr>
+          <a:lstStyle>
+            <a:lvl1pPr marL="171450" indent="-171450" algn="l" defTabSz="685800" rtl="0" eaLnBrk="1" latinLnBrk="0" hangingPunct="1">
+              <a:lnSpc>
+                <a:spcPct val="90000"/>
+              </a:lnSpc>
+              <a:spcBef>
+                <a:spcPts val="750"/>
+              </a:spcBef>
+              <a:buFont typeface="Arial" panose="020B0604020202020204" pitchFamily="34" charset="0"/>
+              <a:buChar char="•"/>
+              <a:defRPr sz="2100" kern="1200">
+                <a:solidFill>
+                  <a:schemeClr val="tx1"/>
+                </a:solidFill>
+                <a:latin typeface="+mn-lt"/>
+                <a:ea typeface="+mn-ea"/>
+                <a:cs typeface="+mn-cs"/>
+              </a:defRPr>
+            </a:lvl1pPr>
+            <a:lvl2pPr marL="514350" indent="-171450" algn="l" defTabSz="685800" rtl="0" eaLnBrk="1" latinLnBrk="0" hangingPunct="1">
+              <a:lnSpc>
+                <a:spcPct val="90000"/>
+              </a:lnSpc>
+              <a:spcBef>
+                <a:spcPts val="375"/>
+              </a:spcBef>
+              <a:buFont typeface="Arial" panose="020B0604020202020204" pitchFamily="34" charset="0"/>
+              <a:buChar char="•"/>
+              <a:defRPr sz="1800" kern="1200">
+                <a:solidFill>
+                  <a:schemeClr val="tx1"/>
+                </a:solidFill>
+                <a:latin typeface="+mn-lt"/>
+                <a:ea typeface="+mn-ea"/>
+                <a:cs typeface="+mn-cs"/>
+              </a:defRPr>
+            </a:lvl2pPr>
+            <a:lvl3pPr marL="857250" indent="-171450" algn="l" defTabSz="685800" rtl="0" eaLnBrk="1" latinLnBrk="0" hangingPunct="1">
+              <a:lnSpc>
+                <a:spcPct val="90000"/>
+              </a:lnSpc>
+              <a:spcBef>
+                <a:spcPts val="375"/>
+              </a:spcBef>
+              <a:buFont typeface="Arial" panose="020B0604020202020204" pitchFamily="34" charset="0"/>
+              <a:buChar char="•"/>
+              <a:defRPr sz="1500" kern="1200">
+                <a:solidFill>
+                  <a:schemeClr val="tx1"/>
+                </a:solidFill>
+                <a:latin typeface="+mn-lt"/>
+                <a:ea typeface="+mn-ea"/>
+                <a:cs typeface="+mn-cs"/>
+              </a:defRPr>
+            </a:lvl3pPr>
+            <a:lvl4pPr marL="1200150" indent="-171450" algn="l" defTabSz="685800" rtl="0" eaLnBrk="1" latinLnBrk="0" hangingPunct="1">
+              <a:lnSpc>
+                <a:spcPct val="90000"/>
+              </a:lnSpc>
+              <a:spcBef>
+                <a:spcPts val="375"/>
+              </a:spcBef>
+              <a:buFont typeface="Arial" panose="020B0604020202020204" pitchFamily="34" charset="0"/>
+              <a:buChar char="•"/>
+              <a:defRPr sz="1350" kern="1200">
+                <a:solidFill>
+                  <a:schemeClr val="tx1"/>
+                </a:solidFill>
+                <a:latin typeface="+mn-lt"/>
+                <a:ea typeface="+mn-ea"/>
+                <a:cs typeface="+mn-cs"/>
+              </a:defRPr>
+            </a:lvl4pPr>
+            <a:lvl5pPr marL="1543050" indent="-171450" algn="l" defTabSz="685800" rtl="0" eaLnBrk="1" latinLnBrk="0" hangingPunct="1">
+              <a:lnSpc>
+                <a:spcPct val="90000"/>
+              </a:lnSpc>
+              <a:spcBef>
+                <a:spcPts val="375"/>
+              </a:spcBef>
+              <a:buFont typeface="Arial" panose="020B0604020202020204" pitchFamily="34" charset="0"/>
+              <a:buChar char="•"/>
+              <a:defRPr sz="1350" kern="1200">
+                <a:solidFill>
+                  <a:schemeClr val="tx1"/>
+                </a:solidFill>
+                <a:latin typeface="+mn-lt"/>
+                <a:ea typeface="+mn-ea"/>
+                <a:cs typeface="+mn-cs"/>
+              </a:defRPr>
+            </a:lvl5pPr>
+            <a:lvl6pPr marL="1885950" indent="-171450" algn="l" defTabSz="685800" rtl="0" eaLnBrk="1" latinLnBrk="0" hangingPunct="1">
+              <a:lnSpc>
+                <a:spcPct val="90000"/>
+              </a:lnSpc>
+              <a:spcBef>
+                <a:spcPts val="375"/>
+              </a:spcBef>
+              <a:buFont typeface="Arial" panose="020B0604020202020204" pitchFamily="34" charset="0"/>
+              <a:buChar char="•"/>
+              <a:defRPr sz="1350" kern="1200">
+                <a:solidFill>
+                  <a:schemeClr val="tx1"/>
+                </a:solidFill>
+                <a:latin typeface="+mn-lt"/>
+                <a:ea typeface="+mn-ea"/>
+                <a:cs typeface="+mn-cs"/>
+              </a:defRPr>
+            </a:lvl6pPr>
+            <a:lvl7pPr marL="2228850" indent="-171450" algn="l" defTabSz="685800" rtl="0" eaLnBrk="1" latinLnBrk="0" hangingPunct="1">
+              <a:lnSpc>
+                <a:spcPct val="90000"/>
+              </a:lnSpc>
+              <a:spcBef>
+                <a:spcPts val="375"/>
+              </a:spcBef>
+              <a:buFont typeface="Arial" panose="020B0604020202020204" pitchFamily="34" charset="0"/>
+              <a:buChar char="•"/>
+              <a:defRPr sz="1350" kern="1200">
+                <a:solidFill>
+                  <a:schemeClr val="tx1"/>
+                </a:solidFill>
+                <a:latin typeface="+mn-lt"/>
+                <a:ea typeface="+mn-ea"/>
+                <a:cs typeface="+mn-cs"/>
+              </a:defRPr>
+            </a:lvl7pPr>
+            <a:lvl8pPr marL="2571750" indent="-171450" algn="l" defTabSz="685800" rtl="0" eaLnBrk="1" latinLnBrk="0" hangingPunct="1">
+              <a:lnSpc>
+                <a:spcPct val="90000"/>
+              </a:lnSpc>
+              <a:spcBef>
+                <a:spcPts val="375"/>
+              </a:spcBef>
+              <a:buFont typeface="Arial" panose="020B0604020202020204" pitchFamily="34" charset="0"/>
+              <a:buChar char="•"/>
+              <a:defRPr sz="1350" kern="1200">
+                <a:solidFill>
+                  <a:schemeClr val="tx1"/>
+                </a:solidFill>
+                <a:latin typeface="+mn-lt"/>
+                <a:ea typeface="+mn-ea"/>
+                <a:cs typeface="+mn-cs"/>
+              </a:defRPr>
+            </a:lvl8pPr>
+            <a:lvl9pPr marL="2914650" indent="-171450" algn="l" defTabSz="685800" rtl="0" eaLnBrk="1" latinLnBrk="0" hangingPunct="1">
+              <a:lnSpc>
+                <a:spcPct val="90000"/>
+              </a:lnSpc>
+              <a:spcBef>
+                <a:spcPts val="375"/>
+              </a:spcBef>
+              <a:buFont typeface="Arial" panose="020B0604020202020204" pitchFamily="34" charset="0"/>
+              <a:buChar char="•"/>
+              <a:defRPr sz="1350" kern="1200">
+                <a:solidFill>
+                  <a:schemeClr val="tx1"/>
+                </a:solidFill>
+                <a:latin typeface="+mn-lt"/>
+                <a:ea typeface="+mn-ea"/>
+                <a:cs typeface="+mn-cs"/>
+              </a:defRPr>
+            </a:lvl9pPr>
+          </a:lstStyle>
+          <a:p>
+            <a:pPr>
+              <a:lnSpc>
+                <a:spcPct val="120000"/>
+              </a:lnSpc>
+            </a:pPr>
+            <a:r>
+              <a:rPr lang="en-US" sz="2000" b="1" dirty="0">
+                <a:solidFill>
+                  <a:schemeClr val="accent5"/>
+                </a:solidFill>
+                <a:latin typeface="Times New Roman" panose="02020603050405020304" pitchFamily="18" charset="0"/>
+                <a:cs typeface="Times New Roman" panose="02020603050405020304" pitchFamily="18" charset="0"/>
+              </a:rPr>
+              <a:t>[Class </a:t>
+            </a:r>
+            <a:r>
+              <a:rPr lang="en-US" sz="2000" b="1" dirty="0" smtClean="0">
+                <a:solidFill>
+                  <a:schemeClr val="accent5"/>
+                </a:solidFill>
+                <a:latin typeface="Times New Roman" panose="02020603050405020304" pitchFamily="18" charset="0"/>
+                <a:cs typeface="Times New Roman" panose="02020603050405020304" pitchFamily="18" charset="0"/>
+              </a:rPr>
+              <a:t>Model]</a:t>
+            </a:r>
+            <a:r>
+              <a:rPr lang="en-US" sz="2000" b="1" dirty="0" smtClean="0">
+                <a:latin typeface="Times New Roman" panose="02020603050405020304" pitchFamily="18" charset="0"/>
+                <a:cs typeface="Times New Roman" panose="02020603050405020304" pitchFamily="18" charset="0"/>
+              </a:rPr>
+              <a:t> Use </a:t>
+            </a:r>
+            <a:r>
+              <a:rPr lang="en-US" sz="2000" b="1" dirty="0">
+                <a:latin typeface="Times New Roman" panose="02020603050405020304" pitchFamily="18" charset="0"/>
+                <a:cs typeface="Times New Roman" panose="02020603050405020304" pitchFamily="18" charset="0"/>
+              </a:rPr>
+              <a:t>Case Model of the Library System</a:t>
+            </a:r>
+          </a:p>
+          <a:p>
+            <a:pPr>
+              <a:buClr>
+                <a:schemeClr val="accent1">
+                  <a:lumMod val="75000"/>
+                </a:schemeClr>
+              </a:buClr>
+            </a:pPr>
+            <a:r>
+              <a:rPr lang="en-US" sz="2000" b="1" dirty="0">
+                <a:solidFill>
+                  <a:schemeClr val="accent5"/>
+                </a:solidFill>
+                <a:latin typeface="Times New Roman" panose="02020603050405020304" pitchFamily="18" charset="0"/>
+                <a:cs typeface="Times New Roman" panose="02020603050405020304" pitchFamily="18" charset="0"/>
+              </a:rPr>
+              <a:t>[Class </a:t>
+            </a:r>
+            <a:r>
+              <a:rPr lang="en-US" sz="2000" b="1" dirty="0" smtClean="0">
+                <a:solidFill>
+                  <a:schemeClr val="accent5"/>
+                </a:solidFill>
+                <a:latin typeface="Times New Roman" panose="02020603050405020304" pitchFamily="18" charset="0"/>
+                <a:cs typeface="Times New Roman" panose="02020603050405020304" pitchFamily="18" charset="0"/>
+              </a:rPr>
+              <a:t>Model]</a:t>
+            </a:r>
+            <a:r>
+              <a:rPr lang="en-US" sz="2000" b="1" dirty="0" smtClean="0">
+                <a:latin typeface="Times New Roman" panose="02020603050405020304" pitchFamily="18" charset="0"/>
+                <a:cs typeface="Times New Roman" panose="02020603050405020304" pitchFamily="18" charset="0"/>
+              </a:rPr>
+              <a:t> Checkout </a:t>
+            </a:r>
+            <a:r>
+              <a:rPr lang="en-US" sz="2000" b="1" dirty="0">
+                <a:latin typeface="Times New Roman" panose="02020603050405020304" pitchFamily="18" charset="0"/>
+                <a:cs typeface="Times New Roman" panose="02020603050405020304" pitchFamily="18" charset="0"/>
+              </a:rPr>
+              <a:t>done by the Librarian </a:t>
+            </a:r>
+            <a:endParaRPr lang="en-US" sz="2000" b="1" dirty="0" smtClean="0">
+              <a:latin typeface="Times New Roman" panose="02020603050405020304" pitchFamily="18" charset="0"/>
+              <a:cs typeface="Times New Roman" panose="02020603050405020304" pitchFamily="18" charset="0"/>
+            </a:endParaRPr>
+          </a:p>
+          <a:p>
+            <a:pPr>
+              <a:buClr>
+                <a:schemeClr val="accent1">
+                  <a:lumMod val="75000"/>
+                </a:schemeClr>
+              </a:buClr>
+            </a:pPr>
+            <a:r>
+              <a:rPr lang="en-US" sz="2000" b="1" dirty="0">
+                <a:solidFill>
+                  <a:schemeClr val="accent5"/>
+                </a:solidFill>
+                <a:latin typeface="Times New Roman" panose="02020603050405020304" pitchFamily="18" charset="0"/>
+                <a:cs typeface="Times New Roman" panose="02020603050405020304" pitchFamily="18" charset="0"/>
+              </a:rPr>
+              <a:t>[Sequence </a:t>
+            </a:r>
+            <a:r>
+              <a:rPr lang="en-US" sz="2000" b="1" dirty="0" smtClean="0">
+                <a:solidFill>
+                  <a:schemeClr val="accent5"/>
+                </a:solidFill>
+                <a:latin typeface="Times New Roman" panose="02020603050405020304" pitchFamily="18" charset="0"/>
+                <a:cs typeface="Times New Roman" panose="02020603050405020304" pitchFamily="18" charset="0"/>
+              </a:rPr>
+              <a:t>Diagram] </a:t>
+            </a:r>
+            <a:r>
+              <a:rPr lang="en-US" sz="2000" b="1" dirty="0" smtClean="0">
+                <a:latin typeface="Times New Roman" panose="02020603050405020304" pitchFamily="18" charset="0"/>
+                <a:cs typeface="Times New Roman" panose="02020603050405020304" pitchFamily="18" charset="0"/>
+              </a:rPr>
+              <a:t>Checkout </a:t>
+            </a:r>
+            <a:r>
+              <a:rPr lang="en-US" sz="2000" b="1" dirty="0">
+                <a:latin typeface="Times New Roman" panose="02020603050405020304" pitchFamily="18" charset="0"/>
+                <a:cs typeface="Times New Roman" panose="02020603050405020304" pitchFamily="18" charset="0"/>
+              </a:rPr>
+              <a:t>Book </a:t>
+            </a:r>
+            <a:endParaRPr lang="en-US" sz="2000" b="1" dirty="0" smtClean="0">
+              <a:latin typeface="Times New Roman" panose="02020603050405020304" pitchFamily="18" charset="0"/>
+              <a:cs typeface="Times New Roman" panose="02020603050405020304" pitchFamily="18" charset="0"/>
+            </a:endParaRPr>
+          </a:p>
+          <a:p>
+            <a:pPr>
+              <a:buClr>
+                <a:schemeClr val="accent1">
+                  <a:lumMod val="75000"/>
+                </a:schemeClr>
+              </a:buClr>
+            </a:pPr>
+            <a:r>
+              <a:rPr lang="en-US" sz="2000" b="1" dirty="0">
+                <a:solidFill>
+                  <a:schemeClr val="accent5"/>
+                </a:solidFill>
+                <a:latin typeface="Times New Roman" panose="02020603050405020304" pitchFamily="18" charset="0"/>
+                <a:cs typeface="Times New Roman" panose="02020603050405020304" pitchFamily="18" charset="0"/>
+              </a:rPr>
+              <a:t>[Sequence </a:t>
+            </a:r>
+            <a:r>
+              <a:rPr lang="en-US" sz="2000" b="1" dirty="0" smtClean="0">
+                <a:solidFill>
+                  <a:schemeClr val="accent5"/>
+                </a:solidFill>
+                <a:latin typeface="Times New Roman" panose="02020603050405020304" pitchFamily="18" charset="0"/>
+                <a:cs typeface="Times New Roman" panose="02020603050405020304" pitchFamily="18" charset="0"/>
+              </a:rPr>
+              <a:t>Diagram]</a:t>
+            </a:r>
+            <a:r>
+              <a:rPr lang="en-US" sz="2000" b="1" dirty="0" smtClean="0">
+                <a:latin typeface="Times New Roman" panose="02020603050405020304" pitchFamily="18" charset="0"/>
+                <a:cs typeface="Times New Roman" panose="02020603050405020304" pitchFamily="18" charset="0"/>
+              </a:rPr>
+              <a:t> Add Book</a:t>
+            </a:r>
+          </a:p>
+          <a:p>
+            <a:pPr>
+              <a:buClr>
+                <a:schemeClr val="accent1">
+                  <a:lumMod val="75000"/>
+                </a:schemeClr>
+              </a:buClr>
+            </a:pPr>
+            <a:r>
+              <a:rPr lang="en-US" sz="2000" b="1" dirty="0">
+                <a:solidFill>
+                  <a:schemeClr val="accent5"/>
+                </a:solidFill>
+                <a:latin typeface="Times New Roman" panose="02020603050405020304" pitchFamily="18" charset="0"/>
+                <a:cs typeface="Times New Roman" panose="02020603050405020304" pitchFamily="18" charset="0"/>
+              </a:rPr>
+              <a:t>[Validation Rules] </a:t>
+            </a:r>
+            <a:r>
+              <a:rPr lang="en-US" sz="2000" b="1" dirty="0" smtClean="0">
+                <a:latin typeface="Times New Roman" panose="02020603050405020304" pitchFamily="18" charset="0"/>
+                <a:cs typeface="Times New Roman" panose="02020603050405020304" pitchFamily="18" charset="0"/>
+              </a:rPr>
+              <a:t>Data </a:t>
+            </a:r>
+            <a:r>
+              <a:rPr lang="en-US" sz="2000" b="1" dirty="0">
+                <a:latin typeface="Times New Roman" panose="02020603050405020304" pitchFamily="18" charset="0"/>
+                <a:cs typeface="Times New Roman" panose="02020603050405020304" pitchFamily="18" charset="0"/>
+              </a:rPr>
+              <a:t>validation rules of UI Windows </a:t>
+            </a:r>
+            <a:r>
+              <a:rPr lang="en-US" sz="2000" b="1" dirty="0" smtClean="0">
+                <a:latin typeface="Times New Roman" panose="02020603050405020304" pitchFamily="18" charset="0"/>
+                <a:cs typeface="Times New Roman" panose="02020603050405020304" pitchFamily="18" charset="0"/>
+              </a:rPr>
+              <a:t> </a:t>
+            </a:r>
+          </a:p>
+          <a:p>
+            <a:pPr>
+              <a:buClr>
+                <a:schemeClr val="accent1">
+                  <a:lumMod val="75000"/>
+                </a:schemeClr>
+              </a:buClr>
+            </a:pPr>
+            <a:r>
+              <a:rPr lang="en-US" sz="2000" b="1" dirty="0">
+                <a:solidFill>
+                  <a:schemeClr val="accent5"/>
+                </a:solidFill>
+                <a:latin typeface="Times New Roman" panose="02020603050405020304" pitchFamily="18" charset="0"/>
+                <a:cs typeface="Times New Roman" panose="02020603050405020304" pitchFamily="18" charset="0"/>
+              </a:rPr>
+              <a:t>[Extra Use Cases] </a:t>
+            </a:r>
+            <a:r>
+              <a:rPr lang="en-US" sz="2000" b="1" dirty="0" smtClean="0">
+                <a:solidFill>
+                  <a:schemeClr val="accent5"/>
+                </a:solidFill>
+                <a:latin typeface="Times New Roman" panose="02020603050405020304" pitchFamily="18" charset="0"/>
+                <a:cs typeface="Times New Roman" panose="02020603050405020304" pitchFamily="18" charset="0"/>
+              </a:rPr>
+              <a:t>– 1 </a:t>
+            </a:r>
+            <a:r>
+              <a:rPr lang="en-US" sz="2000" b="1" dirty="0">
+                <a:latin typeface="Times New Roman" panose="02020603050405020304" pitchFamily="18" charset="0"/>
+                <a:cs typeface="Times New Roman" panose="02020603050405020304" pitchFamily="18" charset="0"/>
+              </a:rPr>
+              <a:t>Populating individual members checkout record</a:t>
+            </a:r>
+            <a:endParaRPr lang="en-US" sz="2000" b="1" dirty="0" smtClean="0">
+              <a:solidFill>
+                <a:schemeClr val="accent5"/>
+              </a:solidFill>
+              <a:latin typeface="Times New Roman" panose="02020603050405020304" pitchFamily="18" charset="0"/>
+              <a:cs typeface="Times New Roman" panose="02020603050405020304" pitchFamily="18" charset="0"/>
+            </a:endParaRPr>
+          </a:p>
+          <a:p>
+            <a:pPr>
+              <a:buClr>
+                <a:schemeClr val="accent1">
+                  <a:lumMod val="75000"/>
+                </a:schemeClr>
+              </a:buClr>
+            </a:pPr>
+            <a:r>
+              <a:rPr lang="en-US" sz="2000" b="1" dirty="0">
+                <a:solidFill>
+                  <a:schemeClr val="accent5"/>
+                </a:solidFill>
+                <a:latin typeface="Times New Roman" panose="02020603050405020304" pitchFamily="18" charset="0"/>
+                <a:cs typeface="Times New Roman" panose="02020603050405020304" pitchFamily="18" charset="0"/>
+              </a:rPr>
+              <a:t>[Extra Use Cases] </a:t>
+            </a:r>
+            <a:r>
+              <a:rPr lang="en-US" sz="2000" b="1" dirty="0" smtClean="0">
+                <a:solidFill>
+                  <a:schemeClr val="accent5"/>
+                </a:solidFill>
+                <a:latin typeface="Times New Roman" panose="02020603050405020304" pitchFamily="18" charset="0"/>
+                <a:cs typeface="Times New Roman" panose="02020603050405020304" pitchFamily="18" charset="0"/>
+              </a:rPr>
+              <a:t>– 2 </a:t>
+            </a:r>
+            <a:r>
+              <a:rPr lang="en-US" sz="2000" b="1" dirty="0">
+                <a:latin typeface="Times New Roman" panose="02020603050405020304" pitchFamily="18" charset="0"/>
+                <a:cs typeface="Times New Roman" panose="02020603050405020304" pitchFamily="18" charset="0"/>
+              </a:rPr>
+              <a:t>Populating overdue publication list</a:t>
+            </a:r>
+            <a:endParaRPr lang="en-US" sz="2000" b="1" dirty="0" smtClean="0">
+              <a:solidFill>
+                <a:schemeClr val="accent5"/>
+              </a:solidFill>
+              <a:latin typeface="Times New Roman" panose="02020603050405020304" pitchFamily="18" charset="0"/>
+              <a:cs typeface="Times New Roman" panose="02020603050405020304" pitchFamily="18" charset="0"/>
+            </a:endParaRPr>
+          </a:p>
+          <a:p>
+            <a:pPr>
+              <a:buClr>
+                <a:schemeClr val="accent1">
+                  <a:lumMod val="75000"/>
+                </a:schemeClr>
+              </a:buClr>
+            </a:pPr>
+            <a:r>
+              <a:rPr lang="en-US" sz="2000" b="1" dirty="0">
+                <a:solidFill>
+                  <a:schemeClr val="accent5"/>
+                </a:solidFill>
+                <a:latin typeface="Times New Roman" panose="02020603050405020304" pitchFamily="18" charset="0"/>
+                <a:cs typeface="Times New Roman" panose="02020603050405020304" pitchFamily="18" charset="0"/>
+              </a:rPr>
+              <a:t>SCI Knowledge </a:t>
+            </a:r>
+            <a:endParaRPr lang="en-US" sz="6000" b="1" dirty="0">
+              <a:latin typeface="Times New Roman" panose="02020603050405020304" pitchFamily="18" charset="0"/>
+              <a:cs typeface="Times New Roman" panose="02020603050405020304" pitchFamily="18" charset="0"/>
+            </a:endParaRPr>
+          </a:p>
+          <a:p>
+            <a:pPr>
+              <a:buClr>
+                <a:schemeClr val="accent1">
+                  <a:lumMod val="75000"/>
+                </a:schemeClr>
+              </a:buClr>
+            </a:pPr>
+            <a:endParaRPr lang="en-US" sz="4000" b="1" dirty="0">
+              <a:latin typeface="Times New Roman" panose="02020603050405020304" pitchFamily="18" charset="0"/>
+              <a:cs typeface="Times New Roman" panose="02020603050405020304" pitchFamily="18" charset="0"/>
+            </a:endParaRPr>
+          </a:p>
+          <a:p>
+            <a:pPr>
+              <a:buClr>
+                <a:schemeClr val="accent1">
+                  <a:lumMod val="75000"/>
+                </a:schemeClr>
+              </a:buClr>
+            </a:pPr>
+            <a:endParaRPr lang="en-US" sz="2400" b="1" dirty="0">
+              <a:latin typeface="Times New Roman" panose="02020603050405020304" pitchFamily="18" charset="0"/>
+              <a:cs typeface="Times New Roman" panose="02020603050405020304" pitchFamily="18" charset="0"/>
+            </a:endParaRPr>
+          </a:p>
+          <a:p>
+            <a:pPr>
+              <a:buClr>
+                <a:schemeClr val="accent1">
+                  <a:lumMod val="75000"/>
+                </a:schemeClr>
+              </a:buClr>
+            </a:pPr>
+            <a:endParaRPr lang="en-US" sz="2400" dirty="0"/>
+          </a:p>
+        </p:txBody>
+      </p:sp>
+    </p:spTree>
+    <p:extLst>
+      <p:ext uri="{BB962C8B-B14F-4D97-AF65-F5344CB8AC3E}">
+        <p14:creationId xmlns:p14="http://schemas.microsoft.com/office/powerpoint/2010/main" val="555993934"/>
+      </p:ext>
+    </p:extLst>
+  </p:cSld>
+  <p:clrMapOvr>
+    <a:masterClrMapping/>
+  </p:clrMapOvr>
+</p:sld>
+</file>
+
+<file path=ppt/slides/slide3.xml><?xml version="1.0" encoding="utf-8"?>
+<p:sld xmlns:a="http://schemas.openxmlformats.org/drawingml/2006/main" xmlns:r="http://schemas.openxmlformats.org/officeDocument/2006/relationships" xmlns:p="http://schemas.openxmlformats.org/presentationml/2006/main">
+  <p:cSld>
+    <p:spTree>
+      <p:nvGrpSpPr>
+        <p:cNvPr id="1" name=""/>
+        <p:cNvGrpSpPr/>
+        <p:nvPr/>
+      </p:nvGrpSpPr>
+      <p:grpSpPr>
+        <a:xfrm>
+          <a:off x="0" y="0"/>
+          <a:ext cx="0" cy="0"/>
+          <a:chOff x="0" y="0"/>
+          <a:chExt cx="0" cy="0"/>
+        </a:xfrm>
+      </p:grpSpPr>
+      <p:sp>
+        <p:nvSpPr>
+          <p:cNvPr id="4" name="Title 1"/>
+          <p:cNvSpPr txBox="1">
+            <a:spLocks/>
+          </p:cNvSpPr>
+          <p:nvPr/>
+        </p:nvSpPr>
+        <p:spPr>
+          <a:xfrm>
+            <a:off x="628650" y="164828"/>
+            <a:ext cx="7886700" cy="845365"/>
+          </a:xfrm>
+          <a:prstGeom prst="rect">
+            <a:avLst/>
+          </a:prstGeom>
+        </p:spPr>
+        <p:txBody>
+          <a:bodyPr vert="horz" lIns="91440" tIns="45720" rIns="91440" bIns="45720" rtlCol="0" anchor="ctr">
+            <a:normAutofit fontScale="90000" lnSpcReduction="10000"/>
+          </a:bodyPr>
+          <a:lstStyle>
+            <a:lvl1pPr algn="l" defTabSz="685800" rtl="0" eaLnBrk="1" latinLnBrk="0" hangingPunct="1">
+              <a:lnSpc>
+                <a:spcPct val="90000"/>
+              </a:lnSpc>
+              <a:spcBef>
+                <a:spcPct val="0"/>
+              </a:spcBef>
+              <a:buNone/>
+              <a:defRPr sz="3300" kern="1200">
+                <a:solidFill>
+                  <a:schemeClr val="tx1"/>
+                </a:solidFill>
+                <a:latin typeface="+mj-lt"/>
+                <a:ea typeface="+mj-ea"/>
+                <a:cs typeface="+mj-cs"/>
+              </a:defRPr>
+            </a:lvl1pPr>
+          </a:lstStyle>
+          <a:p>
+            <a:pPr>
+              <a:lnSpc>
+                <a:spcPct val="120000"/>
+              </a:lnSpc>
+            </a:pPr>
+            <a:r>
+              <a:rPr lang="en-US" sz="1800" b="1" dirty="0" smtClean="0">
+                <a:solidFill>
+                  <a:schemeClr val="accent5"/>
+                </a:solidFill>
+                <a:latin typeface="Times New Roman" panose="02020603050405020304" pitchFamily="18" charset="0"/>
+                <a:cs typeface="Times New Roman" panose="02020603050405020304" pitchFamily="18" charset="0"/>
+              </a:rPr>
+              <a:t>[Class Model]</a:t>
+            </a:r>
+            <a:r>
+              <a:rPr lang="en-US" b="1" dirty="0" smtClean="0">
+                <a:latin typeface="Times New Roman" panose="02020603050405020304" pitchFamily="18" charset="0"/>
+                <a:cs typeface="Times New Roman" panose="02020603050405020304" pitchFamily="18" charset="0"/>
+              </a:rPr>
+              <a:t/>
+            </a:r>
+            <a:br>
+              <a:rPr lang="en-US" b="1" dirty="0" smtClean="0">
+                <a:latin typeface="Times New Roman" panose="02020603050405020304" pitchFamily="18" charset="0"/>
+                <a:cs typeface="Times New Roman" panose="02020603050405020304" pitchFamily="18" charset="0"/>
+              </a:rPr>
+            </a:br>
+            <a:r>
+              <a:rPr lang="en-US" sz="3100" b="1" dirty="0">
+                <a:latin typeface="Times New Roman" panose="02020603050405020304" pitchFamily="18" charset="0"/>
+                <a:cs typeface="Times New Roman" panose="02020603050405020304" pitchFamily="18" charset="0"/>
+              </a:rPr>
+              <a:t>Use Case Model of the Library System</a:t>
+            </a:r>
+          </a:p>
+        </p:txBody>
+      </p:sp>
+      <p:pic>
+        <p:nvPicPr>
+          <p:cNvPr id="7" name="Picture 6"/>
+          <p:cNvPicPr>
+            <a:picLocks noChangeAspect="1"/>
+          </p:cNvPicPr>
+          <p:nvPr/>
+        </p:nvPicPr>
+        <p:blipFill>
+          <a:blip r:embed="rId2"/>
+          <a:stretch>
+            <a:fillRect/>
+          </a:stretch>
+        </p:blipFill>
+        <p:spPr>
+          <a:xfrm>
+            <a:off x="994040" y="1142887"/>
+            <a:ext cx="5685434" cy="5331936"/>
+          </a:xfrm>
+          <a:prstGeom prst="rect">
+            <a:avLst/>
+          </a:prstGeom>
+        </p:spPr>
+      </p:pic>
+    </p:spTree>
+    <p:extLst>
+      <p:ext uri="{BB962C8B-B14F-4D97-AF65-F5344CB8AC3E}">
+        <p14:creationId xmlns:p14="http://schemas.microsoft.com/office/powerpoint/2010/main" val="1198667202"/>
+      </p:ext>
+    </p:extLst>
+  </p:cSld>
+  <p:clrMapOvr>
+    <a:masterClrMapping/>
+  </p:clrMapOvr>
+</p:sld>
+</file>
+
+<file path=ppt/slides/slide4.xml><?xml version="1.0" encoding="utf-8"?>
+<p:sld xmlns:a="http://schemas.openxmlformats.org/drawingml/2006/main" xmlns:r="http://schemas.openxmlformats.org/officeDocument/2006/relationships" xmlns:p="http://schemas.openxmlformats.org/presentationml/2006/main">
+  <p:cSld>
+    <p:spTree>
+      <p:nvGrpSpPr>
+        <p:cNvPr id="1" name=""/>
+        <p:cNvGrpSpPr/>
+        <p:nvPr/>
+      </p:nvGrpSpPr>
+      <p:grpSpPr>
+        <a:xfrm>
+          <a:off x="0" y="0"/>
+          <a:ext cx="0" cy="0"/>
+          <a:chOff x="0" y="0"/>
+          <a:chExt cx="0" cy="0"/>
+        </a:xfrm>
+      </p:grpSpPr>
+      <p:sp>
+        <p:nvSpPr>
+          <p:cNvPr id="6" name="Title 1"/>
+          <p:cNvSpPr txBox="1">
+            <a:spLocks/>
+          </p:cNvSpPr>
+          <p:nvPr/>
+        </p:nvSpPr>
+        <p:spPr>
+          <a:xfrm>
+            <a:off x="628650" y="164828"/>
+            <a:ext cx="7886700" cy="845365"/>
+          </a:xfrm>
+          <a:prstGeom prst="rect">
+            <a:avLst/>
+          </a:prstGeom>
+        </p:spPr>
+        <p:txBody>
+          <a:bodyPr vert="horz" lIns="91440" tIns="45720" rIns="91440" bIns="45720" rtlCol="0" anchor="ctr">
+            <a:normAutofit fontScale="90000" lnSpcReduction="10000"/>
+          </a:bodyPr>
+          <a:lstStyle>
+            <a:lvl1pPr algn="l" defTabSz="685800" rtl="0" eaLnBrk="1" latinLnBrk="0" hangingPunct="1">
+              <a:lnSpc>
+                <a:spcPct val="90000"/>
+              </a:lnSpc>
+              <a:spcBef>
+                <a:spcPct val="0"/>
+              </a:spcBef>
+              <a:buNone/>
+              <a:defRPr sz="3300" kern="1200">
+                <a:solidFill>
+                  <a:schemeClr val="tx1"/>
+                </a:solidFill>
+                <a:latin typeface="+mj-lt"/>
+                <a:ea typeface="+mj-ea"/>
+                <a:cs typeface="+mj-cs"/>
+              </a:defRPr>
+            </a:lvl1pPr>
+          </a:lstStyle>
+          <a:p>
+            <a:pPr>
+              <a:lnSpc>
+                <a:spcPct val="120000"/>
+              </a:lnSpc>
+            </a:pPr>
+            <a:r>
+              <a:rPr lang="en-US" sz="1800" b="1" dirty="0" smtClean="0">
+                <a:solidFill>
+                  <a:schemeClr val="accent5"/>
+                </a:solidFill>
+                <a:latin typeface="Times New Roman" panose="02020603050405020304" pitchFamily="18" charset="0"/>
+                <a:cs typeface="Times New Roman" panose="02020603050405020304" pitchFamily="18" charset="0"/>
+              </a:rPr>
+              <a:t>[Class Model]</a:t>
+            </a:r>
+            <a:r>
+              <a:rPr lang="en-US" b="1" dirty="0" smtClean="0">
+                <a:latin typeface="Times New Roman" panose="02020603050405020304" pitchFamily="18" charset="0"/>
+                <a:cs typeface="Times New Roman" panose="02020603050405020304" pitchFamily="18" charset="0"/>
+              </a:rPr>
+              <a:t/>
+            </a:r>
+            <a:br>
+              <a:rPr lang="en-US" b="1" dirty="0" smtClean="0">
+                <a:latin typeface="Times New Roman" panose="02020603050405020304" pitchFamily="18" charset="0"/>
+                <a:cs typeface="Times New Roman" panose="02020603050405020304" pitchFamily="18" charset="0"/>
+              </a:rPr>
+            </a:br>
+            <a:r>
+              <a:rPr lang="en-US" sz="3100" b="1" dirty="0">
+                <a:latin typeface="Times New Roman" panose="02020603050405020304" pitchFamily="18" charset="0"/>
+                <a:cs typeface="Times New Roman" panose="02020603050405020304" pitchFamily="18" charset="0"/>
+              </a:rPr>
+              <a:t>Checkout done by the Librarian </a:t>
+            </a:r>
+          </a:p>
+        </p:txBody>
+      </p:sp>
+    </p:spTree>
+    <p:extLst>
+      <p:ext uri="{BB962C8B-B14F-4D97-AF65-F5344CB8AC3E}">
+        <p14:creationId xmlns:p14="http://schemas.microsoft.com/office/powerpoint/2010/main" val="4258724875"/>
+      </p:ext>
+    </p:extLst>
+  </p:cSld>
+  <p:clrMapOvr>
+    <a:masterClrMapping/>
+  </p:clrMapOvr>
+  <p:timing>
+    <p:tnLst>
+      <p:par>
+        <p:cTn id="1" dur="indefinite" restart="never" nodeType="tmRoot"/>
+      </p:par>
+    </p:tnLst>
+  </p:timing>
+</p:sld>
+</file>
+
+<file path=ppt/slides/slide5.xml><?xml version="1.0" encoding="utf-8"?>
+<p:sld xmlns:a="http://schemas.openxmlformats.org/drawingml/2006/main" xmlns:r="http://schemas.openxmlformats.org/officeDocument/2006/relationships" xmlns:p="http://schemas.openxmlformats.org/presentationml/2006/main">
+  <p:cSld>
+    <p:spTree>
+      <p:nvGrpSpPr>
+        <p:cNvPr id="1" name=""/>
+        <p:cNvGrpSpPr/>
+        <p:nvPr/>
+      </p:nvGrpSpPr>
+      <p:grpSpPr>
+        <a:xfrm>
+          <a:off x="0" y="0"/>
+          <a:ext cx="0" cy="0"/>
+          <a:chOff x="0" y="0"/>
+          <a:chExt cx="0" cy="0"/>
+        </a:xfrm>
+      </p:grpSpPr>
+      <p:sp>
+        <p:nvSpPr>
+          <p:cNvPr id="6" name="Title 1"/>
+          <p:cNvSpPr txBox="1">
+            <a:spLocks/>
+          </p:cNvSpPr>
+          <p:nvPr/>
+        </p:nvSpPr>
+        <p:spPr>
+          <a:xfrm>
+            <a:off x="628650" y="164828"/>
+            <a:ext cx="7886700" cy="845365"/>
+          </a:xfrm>
+          <a:prstGeom prst="rect">
+            <a:avLst/>
+          </a:prstGeom>
+        </p:spPr>
+        <p:txBody>
+          <a:bodyPr vert="horz" lIns="91440" tIns="45720" rIns="91440" bIns="45720" rtlCol="0" anchor="ctr">
+            <a:normAutofit fontScale="90000" lnSpcReduction="10000"/>
+          </a:bodyPr>
+          <a:lstStyle>
+            <a:lvl1pPr algn="l" defTabSz="685800" rtl="0" eaLnBrk="1" latinLnBrk="0" hangingPunct="1">
+              <a:lnSpc>
+                <a:spcPct val="90000"/>
+              </a:lnSpc>
+              <a:spcBef>
+                <a:spcPct val="0"/>
+              </a:spcBef>
+              <a:buNone/>
+              <a:defRPr sz="3300" kern="1200">
+                <a:solidFill>
+                  <a:schemeClr val="tx1"/>
+                </a:solidFill>
+                <a:latin typeface="+mj-lt"/>
+                <a:ea typeface="+mj-ea"/>
+                <a:cs typeface="+mj-cs"/>
+              </a:defRPr>
+            </a:lvl1pPr>
+          </a:lstStyle>
+          <a:p>
+            <a:pPr>
+              <a:lnSpc>
+                <a:spcPct val="120000"/>
+              </a:lnSpc>
+            </a:pPr>
+            <a:r>
+              <a:rPr lang="en-US" sz="1800" b="1" dirty="0" smtClean="0">
+                <a:solidFill>
+                  <a:schemeClr val="accent5"/>
+                </a:solidFill>
+                <a:latin typeface="Times New Roman" panose="02020603050405020304" pitchFamily="18" charset="0"/>
+                <a:cs typeface="Times New Roman" panose="02020603050405020304" pitchFamily="18" charset="0"/>
+              </a:rPr>
+              <a:t>[Sequence Diagram]</a:t>
+            </a:r>
+            <a:r>
+              <a:rPr lang="en-US" b="1" dirty="0" smtClean="0">
+                <a:latin typeface="Times New Roman" panose="02020603050405020304" pitchFamily="18" charset="0"/>
+                <a:cs typeface="Times New Roman" panose="02020603050405020304" pitchFamily="18" charset="0"/>
+              </a:rPr>
+              <a:t/>
+            </a:r>
+            <a:br>
+              <a:rPr lang="en-US" b="1" dirty="0" smtClean="0">
+                <a:latin typeface="Times New Roman" panose="02020603050405020304" pitchFamily="18" charset="0"/>
+                <a:cs typeface="Times New Roman" panose="02020603050405020304" pitchFamily="18" charset="0"/>
+              </a:rPr>
+            </a:br>
+            <a:r>
+              <a:rPr lang="en-US" sz="3100" b="1" dirty="0" smtClean="0">
+                <a:latin typeface="Times New Roman" panose="02020603050405020304" pitchFamily="18" charset="0"/>
+                <a:cs typeface="Times New Roman" panose="02020603050405020304" pitchFamily="18" charset="0"/>
+              </a:rPr>
+              <a:t>Checkout Book </a:t>
+            </a:r>
+            <a:endParaRPr lang="en-US" sz="3100" b="1" dirty="0">
+              <a:latin typeface="Times New Roman" panose="02020603050405020304" pitchFamily="18" charset="0"/>
+              <a:cs typeface="Times New Roman" panose="02020603050405020304" pitchFamily="18" charset="0"/>
+            </a:endParaRPr>
+          </a:p>
+        </p:txBody>
+      </p:sp>
+      <p:pic>
+        <p:nvPicPr>
+          <p:cNvPr id="7" name="Picture 6"/>
+          <p:cNvPicPr>
+            <a:picLocks noChangeAspect="1"/>
+          </p:cNvPicPr>
+          <p:nvPr/>
+        </p:nvPicPr>
+        <p:blipFill>
+          <a:blip r:embed="rId2" cstate="print">
+            <a:extLst>
+              <a:ext uri="{28A0092B-C50C-407E-A947-70E740481C1C}">
+                <a14:useLocalDpi xmlns:a14="http://schemas.microsoft.com/office/drawing/2010/main" val="0"/>
+              </a:ext>
+            </a:extLst>
+          </a:blip>
+          <a:stretch>
+            <a:fillRect/>
+          </a:stretch>
+        </p:blipFill>
+        <p:spPr>
+          <a:xfrm>
+            <a:off x="1400415" y="1010193"/>
+            <a:ext cx="6465089" cy="5612672"/>
+          </a:xfrm>
+          <a:prstGeom prst="rect">
+            <a:avLst/>
+          </a:prstGeom>
+        </p:spPr>
+      </p:pic>
+    </p:spTree>
+    <p:extLst>
+      <p:ext uri="{BB962C8B-B14F-4D97-AF65-F5344CB8AC3E}">
+        <p14:creationId xmlns:p14="http://schemas.microsoft.com/office/powerpoint/2010/main" val="642857034"/>
+      </p:ext>
+    </p:extLst>
+  </p:cSld>
+  <p:clrMapOvr>
+    <a:masterClrMapping/>
+  </p:clrMapOvr>
+  <p:timing>
+    <p:tnLst>
+      <p:par>
+        <p:cTn id="1" dur="indefinite" restart="never" nodeType="tmRoot"/>
+      </p:par>
+    </p:tnLst>
+  </p:timing>
+</p:sld>
+</file>
+
+<file path=ppt/slides/slide6.xml><?xml version="1.0" encoding="utf-8"?>
+<p:sld xmlns:a="http://schemas.openxmlformats.org/drawingml/2006/main" xmlns:r="http://schemas.openxmlformats.org/officeDocument/2006/relationships" xmlns:p="http://schemas.openxmlformats.org/presentationml/2006/main">
+  <p:cSld>
+    <p:spTree>
+      <p:nvGrpSpPr>
+        <p:cNvPr id="1" name=""/>
+        <p:cNvGrpSpPr/>
+        <p:nvPr/>
+      </p:nvGrpSpPr>
+      <p:grpSpPr>
+        <a:xfrm>
+          <a:off x="0" y="0"/>
+          <a:ext cx="0" cy="0"/>
+          <a:chOff x="0" y="0"/>
+          <a:chExt cx="0" cy="0"/>
+        </a:xfrm>
+      </p:grpSpPr>
+      <p:sp>
+        <p:nvSpPr>
+          <p:cNvPr id="6" name="Title 1"/>
+          <p:cNvSpPr txBox="1">
+            <a:spLocks/>
+          </p:cNvSpPr>
+          <p:nvPr/>
+        </p:nvSpPr>
+        <p:spPr>
+          <a:xfrm>
+            <a:off x="628650" y="164828"/>
+            <a:ext cx="7886700" cy="845365"/>
+          </a:xfrm>
+          <a:prstGeom prst="rect">
+            <a:avLst/>
+          </a:prstGeom>
+        </p:spPr>
+        <p:txBody>
+          <a:bodyPr vert="horz" lIns="91440" tIns="45720" rIns="91440" bIns="45720" rtlCol="0" anchor="ctr">
+            <a:normAutofit fontScale="90000" lnSpcReduction="10000"/>
+          </a:bodyPr>
+          <a:lstStyle>
+            <a:lvl1pPr algn="l" defTabSz="685800" rtl="0" eaLnBrk="1" latinLnBrk="0" hangingPunct="1">
+              <a:lnSpc>
+                <a:spcPct val="90000"/>
+              </a:lnSpc>
+              <a:spcBef>
+                <a:spcPct val="0"/>
+              </a:spcBef>
+              <a:buNone/>
+              <a:defRPr sz="3300" kern="1200">
+                <a:solidFill>
+                  <a:schemeClr val="tx1"/>
+                </a:solidFill>
+                <a:latin typeface="+mj-lt"/>
+                <a:ea typeface="+mj-ea"/>
+                <a:cs typeface="+mj-cs"/>
+              </a:defRPr>
+            </a:lvl1pPr>
+          </a:lstStyle>
+          <a:p>
+            <a:pPr>
+              <a:lnSpc>
+                <a:spcPct val="120000"/>
+              </a:lnSpc>
+            </a:pPr>
+            <a:r>
+              <a:rPr lang="en-US" sz="1800" b="1" dirty="0" smtClean="0">
+                <a:solidFill>
+                  <a:schemeClr val="accent5"/>
+                </a:solidFill>
+                <a:latin typeface="Times New Roman" panose="02020603050405020304" pitchFamily="18" charset="0"/>
+                <a:cs typeface="Times New Roman" panose="02020603050405020304" pitchFamily="18" charset="0"/>
+              </a:rPr>
+              <a:t>[Sequence Diagram]</a:t>
+            </a:r>
+            <a:r>
+              <a:rPr lang="en-US" b="1" dirty="0" smtClean="0">
+                <a:latin typeface="Times New Roman" panose="02020603050405020304" pitchFamily="18" charset="0"/>
+                <a:cs typeface="Times New Roman" panose="02020603050405020304" pitchFamily="18" charset="0"/>
+              </a:rPr>
+              <a:t/>
+            </a:r>
+            <a:br>
+              <a:rPr lang="en-US" b="1" dirty="0" smtClean="0">
+                <a:latin typeface="Times New Roman" panose="02020603050405020304" pitchFamily="18" charset="0"/>
+                <a:cs typeface="Times New Roman" panose="02020603050405020304" pitchFamily="18" charset="0"/>
+              </a:rPr>
+            </a:br>
+            <a:r>
+              <a:rPr lang="en-US" sz="3100" b="1" dirty="0" smtClean="0">
+                <a:latin typeface="Times New Roman" panose="02020603050405020304" pitchFamily="18" charset="0"/>
+                <a:cs typeface="Times New Roman" panose="02020603050405020304" pitchFamily="18" charset="0"/>
+              </a:rPr>
+              <a:t>Add Book </a:t>
+            </a:r>
+            <a:endParaRPr lang="en-US" sz="3100" b="1" dirty="0">
+              <a:latin typeface="Times New Roman" panose="02020603050405020304" pitchFamily="18" charset="0"/>
+              <a:cs typeface="Times New Roman" panose="02020603050405020304" pitchFamily="18" charset="0"/>
+            </a:endParaRPr>
+          </a:p>
+        </p:txBody>
+      </p:sp>
+      <p:pic>
+        <p:nvPicPr>
+          <p:cNvPr id="2" name="Picture 1"/>
+          <p:cNvPicPr>
+            <a:picLocks noChangeAspect="1"/>
+          </p:cNvPicPr>
+          <p:nvPr/>
+        </p:nvPicPr>
+        <p:blipFill>
+          <a:blip r:embed="rId2" cstate="print">
+            <a:extLst>
+              <a:ext uri="{28A0092B-C50C-407E-A947-70E740481C1C}">
+                <a14:useLocalDpi xmlns:a14="http://schemas.microsoft.com/office/drawing/2010/main" val="0"/>
+              </a:ext>
+            </a:extLst>
+          </a:blip>
+          <a:stretch>
+            <a:fillRect/>
+          </a:stretch>
+        </p:blipFill>
+        <p:spPr>
+          <a:xfrm>
+            <a:off x="628650" y="1140822"/>
+            <a:ext cx="8319161" cy="4742989"/>
+          </a:xfrm>
+          <a:prstGeom prst="rect">
+            <a:avLst/>
+          </a:prstGeom>
+        </p:spPr>
+      </p:pic>
+    </p:spTree>
+    <p:extLst>
+      <p:ext uri="{BB962C8B-B14F-4D97-AF65-F5344CB8AC3E}">
+        <p14:creationId xmlns:p14="http://schemas.microsoft.com/office/powerpoint/2010/main" val="1950055095"/>
+      </p:ext>
+    </p:extLst>
+  </p:cSld>
+  <p:clrMapOvr>
+    <a:masterClrMapping/>
+  </p:clrMapOvr>
+  <p:timing>
+    <p:tnLst>
+      <p:par>
+        <p:cTn id="1" dur="indefinite" restart="never" nodeType="tmRoot"/>
+      </p:par>
+    </p:tnLst>
+  </p:timing>
+</p:sld>
+</file>
+
+<file path=ppt/slides/slide7.xml><?xml version="1.0" encoding="utf-8"?>
+<p:sld xmlns:a="http://schemas.openxmlformats.org/drawingml/2006/main" xmlns:r="http://schemas.openxmlformats.org/officeDocument/2006/relationships" xmlns:p="http://schemas.openxmlformats.org/presentationml/2006/main">
+  <p:cSld>
+    <p:spTree>
+      <p:nvGrpSpPr>
+        <p:cNvPr id="1" name=""/>
+        <p:cNvGrpSpPr/>
+        <p:nvPr/>
+      </p:nvGrpSpPr>
+      <p:grpSpPr>
+        <a:xfrm>
+          <a:off x="0" y="0"/>
+          <a:ext cx="0" cy="0"/>
+          <a:chOff x="0" y="0"/>
+          <a:chExt cx="0" cy="0"/>
+        </a:xfrm>
+      </p:grpSpPr>
+      <p:sp>
+        <p:nvSpPr>
           <p:cNvPr id="2" name="Title 1"/>
           <p:cNvSpPr>
             <a:spLocks noGrp="1"/>
@@ -5025,10 +6669,17 @@
   <p:clrMapOvr>
     <a:masterClrMapping/>
   </p:clrMapOvr>
+  <p:timing>
+    <p:tnLst>
+      <p:par>
+        <p:cTn id="1" dur="indefinite" restart="never" nodeType="tmRoot"/>
+      </p:par>
+    </p:tnLst>
+  </p:timing>
 </p:sld>
 </file>
 
-<file path=ppt/slides/slide3.xml><?xml version="1.0" encoding="utf-8"?>
+<file path=ppt/slides/slide8.xml><?xml version="1.0" encoding="utf-8"?>
 <p:sld xmlns:a="http://schemas.openxmlformats.org/drawingml/2006/main" xmlns:r="http://schemas.openxmlformats.org/officeDocument/2006/relationships" xmlns:p="http://schemas.openxmlformats.org/presentationml/2006/main">
   <p:cSld>
     <p:spTree>
@@ -5379,10 +7030,17 @@
   <p:clrMapOvr>
     <a:masterClrMapping/>
   </p:clrMapOvr>
+  <p:timing>
+    <p:tnLst>
+      <p:par>
+        <p:cTn id="1" dur="indefinite" restart="never" nodeType="tmRoot"/>
+      </p:par>
+    </p:tnLst>
+  </p:timing>
 </p:sld>
 </file>
 
-<file path=ppt/slides/slide4.xml><?xml version="1.0" encoding="utf-8"?>
+<file path=ppt/slides/slide9.xml><?xml version="1.0" encoding="utf-8"?>
 <p:sld xmlns:a="http://schemas.openxmlformats.org/drawingml/2006/main" xmlns:r="http://schemas.openxmlformats.org/officeDocument/2006/relationships" xmlns:p="http://schemas.openxmlformats.org/presentationml/2006/main">
   <p:cSld>
     <p:spTree>
@@ -5723,426 +7381,6 @@
     <p:extLst>
       <p:ext uri="{BB962C8B-B14F-4D97-AF65-F5344CB8AC3E}">
         <p14:creationId xmlns:p14="http://schemas.microsoft.com/office/powerpoint/2010/main" val="1206799137"/>
-      </p:ext>
-    </p:extLst>
-  </p:cSld>
-  <p:clrMapOvr>
-    <a:masterClrMapping/>
-  </p:clrMapOvr>
-</p:sld>
-</file>
-
-<file path=ppt/slides/slide5.xml><?xml version="1.0" encoding="utf-8"?>
-<p:sld xmlns:a="http://schemas.openxmlformats.org/drawingml/2006/main" xmlns:r="http://schemas.openxmlformats.org/officeDocument/2006/relationships" xmlns:p="http://schemas.openxmlformats.org/presentationml/2006/main">
-  <p:cSld>
-    <p:spTree>
-      <p:nvGrpSpPr>
-        <p:cNvPr id="1" name=""/>
-        <p:cNvGrpSpPr/>
-        <p:nvPr/>
-      </p:nvGrpSpPr>
-      <p:grpSpPr>
-        <a:xfrm>
-          <a:off x="0" y="0"/>
-          <a:ext cx="0" cy="0"/>
-          <a:chOff x="0" y="0"/>
-          <a:chExt cx="0" cy="0"/>
-        </a:xfrm>
-      </p:grpSpPr>
-      <p:sp>
-        <p:nvSpPr>
-          <p:cNvPr id="2" name="Title 1"/>
-          <p:cNvSpPr>
-            <a:spLocks noGrp="1"/>
-          </p:cNvSpPr>
-          <p:nvPr>
-            <p:ph type="title"/>
-          </p:nvPr>
-        </p:nvSpPr>
-        <p:spPr>
-          <a:xfrm>
-            <a:off x="287383" y="8706"/>
-            <a:ext cx="8699863" cy="1464266"/>
-          </a:xfrm>
-        </p:spPr>
-        <p:txBody>
-          <a:bodyPr/>
-          <a:lstStyle/>
-          <a:p>
-            <a:pPr algn="ctr">
-              <a:lnSpc>
-                <a:spcPct val="120000"/>
-              </a:lnSpc>
-            </a:pPr>
-            <a:r>
-              <a:rPr lang="en-US" sz="3200" b="1" dirty="0" smtClean="0">
-                <a:solidFill>
-                  <a:srgbClr val="000000"/>
-                </a:solidFill>
-                <a:latin typeface="Times New Roman" panose="02020603050405020304" pitchFamily="18" charset="0"/>
-                <a:cs typeface="Times New Roman" panose="02020603050405020304" pitchFamily="18" charset="0"/>
-              </a:rPr>
-              <a:t>Connecting the Parts of Knowledge With the Wholeness of Knowledge</a:t>
-            </a:r>
-            <a:endParaRPr lang="en-US" b="1" dirty="0">
-              <a:solidFill>
-                <a:srgbClr val="000000"/>
-              </a:solidFill>
-              <a:latin typeface="Times New Roman" panose="02020603050405020304" pitchFamily="18" charset="0"/>
-              <a:cs typeface="Times New Roman" panose="02020603050405020304" pitchFamily="18" charset="0"/>
-            </a:endParaRPr>
-          </a:p>
-        </p:txBody>
-      </p:sp>
-      <p:sp>
-        <p:nvSpPr>
-          <p:cNvPr id="3" name="Content Placeholder 2"/>
-          <p:cNvSpPr>
-            <a:spLocks noGrp="1"/>
-          </p:cNvSpPr>
-          <p:nvPr>
-            <p:ph idx="1"/>
-          </p:nvPr>
-        </p:nvSpPr>
-        <p:spPr>
-          <a:xfrm>
-            <a:off x="628650" y="1454324"/>
-            <a:ext cx="7886700" cy="1881052"/>
-          </a:xfrm>
-        </p:spPr>
-        <p:txBody>
-          <a:bodyPr/>
-          <a:lstStyle/>
-          <a:p>
-            <a:pPr algn="just"/>
-            <a:r>
-              <a:rPr lang="en-US" dirty="0" smtClean="0"/>
-              <a:t>Our developed library management system is built in layers and modules. Business, Data, Data access and library-system (UI) all together forms the library management System. </a:t>
-            </a:r>
-          </a:p>
-          <a:p>
-            <a:pPr algn="just">
-              <a:buClr>
-                <a:srgbClr val="0070C0"/>
-              </a:buClr>
-            </a:pPr>
-            <a:r>
-              <a:rPr lang="en-US" dirty="0" smtClean="0"/>
-              <a:t>In real world Life is found in Layers. Different layers of life interact with each other to create the physical structures. </a:t>
-            </a:r>
-            <a:endParaRPr lang="en-US" dirty="0"/>
-          </a:p>
-        </p:txBody>
-      </p:sp>
-      <p:cxnSp>
-        <p:nvCxnSpPr>
-          <p:cNvPr id="4" name="Straight Connector 4"/>
-          <p:cNvCxnSpPr>
-            <a:cxnSpLocks noChangeShapeType="1"/>
-          </p:cNvCxnSpPr>
-          <p:nvPr/>
-        </p:nvCxnSpPr>
-        <p:spPr bwMode="auto">
-          <a:xfrm>
-            <a:off x="840376" y="3187329"/>
-            <a:ext cx="7593875" cy="0"/>
-          </a:xfrm>
-          <a:prstGeom prst="line">
-            <a:avLst/>
-          </a:prstGeom>
-          <a:noFill/>
-          <a:ln w="19050" algn="ctr">
-            <a:solidFill>
-              <a:schemeClr val="tx1"/>
-            </a:solidFill>
-            <a:round/>
-            <a:headEnd/>
-            <a:tailEnd/>
-          </a:ln>
-        </p:spPr>
-      </p:cxnSp>
-      <p:sp>
-        <p:nvSpPr>
-          <p:cNvPr id="5" name="Content Placeholder 2"/>
-          <p:cNvSpPr txBox="1">
-            <a:spLocks/>
-          </p:cNvSpPr>
-          <p:nvPr/>
-        </p:nvSpPr>
-        <p:spPr>
-          <a:xfrm>
-            <a:off x="693963" y="3274419"/>
-            <a:ext cx="7886700" cy="3378929"/>
-          </a:xfrm>
-          <a:prstGeom prst="rect">
-            <a:avLst/>
-          </a:prstGeom>
-        </p:spPr>
-        <p:txBody>
-          <a:bodyPr vert="horz" lIns="91440" tIns="45720" rIns="91440" bIns="45720" rtlCol="0">
-            <a:noAutofit/>
-          </a:bodyPr>
-          <a:lstStyle>
-            <a:lvl1pPr marL="171450" indent="-171450" algn="l" defTabSz="685800" rtl="0" eaLnBrk="1" latinLnBrk="0" hangingPunct="1">
-              <a:lnSpc>
-                <a:spcPct val="90000"/>
-              </a:lnSpc>
-              <a:spcBef>
-                <a:spcPts val="750"/>
-              </a:spcBef>
-              <a:buFont typeface="Arial" panose="020B0604020202020204" pitchFamily="34" charset="0"/>
-              <a:buChar char="•"/>
-              <a:defRPr sz="2100" kern="1200">
-                <a:solidFill>
-                  <a:schemeClr val="tx1"/>
-                </a:solidFill>
-                <a:latin typeface="+mn-lt"/>
-                <a:ea typeface="+mn-ea"/>
-                <a:cs typeface="+mn-cs"/>
-              </a:defRPr>
-            </a:lvl1pPr>
-            <a:lvl2pPr marL="514350" indent="-171450" algn="l" defTabSz="685800" rtl="0" eaLnBrk="1" latinLnBrk="0" hangingPunct="1">
-              <a:lnSpc>
-                <a:spcPct val="90000"/>
-              </a:lnSpc>
-              <a:spcBef>
-                <a:spcPts val="375"/>
-              </a:spcBef>
-              <a:buFont typeface="Arial" panose="020B0604020202020204" pitchFamily="34" charset="0"/>
-              <a:buChar char="•"/>
-              <a:defRPr sz="1800" kern="1200">
-                <a:solidFill>
-                  <a:schemeClr val="tx1"/>
-                </a:solidFill>
-                <a:latin typeface="+mn-lt"/>
-                <a:ea typeface="+mn-ea"/>
-                <a:cs typeface="+mn-cs"/>
-              </a:defRPr>
-            </a:lvl2pPr>
-            <a:lvl3pPr marL="857250" indent="-171450" algn="l" defTabSz="685800" rtl="0" eaLnBrk="1" latinLnBrk="0" hangingPunct="1">
-              <a:lnSpc>
-                <a:spcPct val="90000"/>
-              </a:lnSpc>
-              <a:spcBef>
-                <a:spcPts val="375"/>
-              </a:spcBef>
-              <a:buFont typeface="Arial" panose="020B0604020202020204" pitchFamily="34" charset="0"/>
-              <a:buChar char="•"/>
-              <a:defRPr sz="1500" kern="1200">
-                <a:solidFill>
-                  <a:schemeClr val="tx1"/>
-                </a:solidFill>
-                <a:latin typeface="+mn-lt"/>
-                <a:ea typeface="+mn-ea"/>
-                <a:cs typeface="+mn-cs"/>
-              </a:defRPr>
-            </a:lvl3pPr>
-            <a:lvl4pPr marL="1200150" indent="-171450" algn="l" defTabSz="685800" rtl="0" eaLnBrk="1" latinLnBrk="0" hangingPunct="1">
-              <a:lnSpc>
-                <a:spcPct val="90000"/>
-              </a:lnSpc>
-              <a:spcBef>
-                <a:spcPts val="375"/>
-              </a:spcBef>
-              <a:buFont typeface="Arial" panose="020B0604020202020204" pitchFamily="34" charset="0"/>
-              <a:buChar char="•"/>
-              <a:defRPr sz="1350" kern="1200">
-                <a:solidFill>
-                  <a:schemeClr val="tx1"/>
-                </a:solidFill>
-                <a:latin typeface="+mn-lt"/>
-                <a:ea typeface="+mn-ea"/>
-                <a:cs typeface="+mn-cs"/>
-              </a:defRPr>
-            </a:lvl4pPr>
-            <a:lvl5pPr marL="1543050" indent="-171450" algn="l" defTabSz="685800" rtl="0" eaLnBrk="1" latinLnBrk="0" hangingPunct="1">
-              <a:lnSpc>
-                <a:spcPct val="90000"/>
-              </a:lnSpc>
-              <a:spcBef>
-                <a:spcPts val="375"/>
-              </a:spcBef>
-              <a:buFont typeface="Arial" panose="020B0604020202020204" pitchFamily="34" charset="0"/>
-              <a:buChar char="•"/>
-              <a:defRPr sz="1350" kern="1200">
-                <a:solidFill>
-                  <a:schemeClr val="tx1"/>
-                </a:solidFill>
-                <a:latin typeface="+mn-lt"/>
-                <a:ea typeface="+mn-ea"/>
-                <a:cs typeface="+mn-cs"/>
-              </a:defRPr>
-            </a:lvl5pPr>
-            <a:lvl6pPr marL="1885950" indent="-171450" algn="l" defTabSz="685800" rtl="0" eaLnBrk="1" latinLnBrk="0" hangingPunct="1">
-              <a:lnSpc>
-                <a:spcPct val="90000"/>
-              </a:lnSpc>
-              <a:spcBef>
-                <a:spcPts val="375"/>
-              </a:spcBef>
-              <a:buFont typeface="Arial" panose="020B0604020202020204" pitchFamily="34" charset="0"/>
-              <a:buChar char="•"/>
-              <a:defRPr sz="1350" kern="1200">
-                <a:solidFill>
-                  <a:schemeClr val="tx1"/>
-                </a:solidFill>
-                <a:latin typeface="+mn-lt"/>
-                <a:ea typeface="+mn-ea"/>
-                <a:cs typeface="+mn-cs"/>
-              </a:defRPr>
-            </a:lvl6pPr>
-            <a:lvl7pPr marL="2228850" indent="-171450" algn="l" defTabSz="685800" rtl="0" eaLnBrk="1" latinLnBrk="0" hangingPunct="1">
-              <a:lnSpc>
-                <a:spcPct val="90000"/>
-              </a:lnSpc>
-              <a:spcBef>
-                <a:spcPts val="375"/>
-              </a:spcBef>
-              <a:buFont typeface="Arial" panose="020B0604020202020204" pitchFamily="34" charset="0"/>
-              <a:buChar char="•"/>
-              <a:defRPr sz="1350" kern="1200">
-                <a:solidFill>
-                  <a:schemeClr val="tx1"/>
-                </a:solidFill>
-                <a:latin typeface="+mn-lt"/>
-                <a:ea typeface="+mn-ea"/>
-                <a:cs typeface="+mn-cs"/>
-              </a:defRPr>
-            </a:lvl7pPr>
-            <a:lvl8pPr marL="2571750" indent="-171450" algn="l" defTabSz="685800" rtl="0" eaLnBrk="1" latinLnBrk="0" hangingPunct="1">
-              <a:lnSpc>
-                <a:spcPct val="90000"/>
-              </a:lnSpc>
-              <a:spcBef>
-                <a:spcPts val="375"/>
-              </a:spcBef>
-              <a:buFont typeface="Arial" panose="020B0604020202020204" pitchFamily="34" charset="0"/>
-              <a:buChar char="•"/>
-              <a:defRPr sz="1350" kern="1200">
-                <a:solidFill>
-                  <a:schemeClr val="tx1"/>
-                </a:solidFill>
-                <a:latin typeface="+mn-lt"/>
-                <a:ea typeface="+mn-ea"/>
-                <a:cs typeface="+mn-cs"/>
-              </a:defRPr>
-            </a:lvl8pPr>
-            <a:lvl9pPr marL="2914650" indent="-171450" algn="l" defTabSz="685800" rtl="0" eaLnBrk="1" latinLnBrk="0" hangingPunct="1">
-              <a:lnSpc>
-                <a:spcPct val="90000"/>
-              </a:lnSpc>
-              <a:spcBef>
-                <a:spcPts val="375"/>
-              </a:spcBef>
-              <a:buFont typeface="Arial" panose="020B0604020202020204" pitchFamily="34" charset="0"/>
-              <a:buChar char="•"/>
-              <a:defRPr sz="1350" kern="1200">
-                <a:solidFill>
-                  <a:schemeClr val="tx1"/>
-                </a:solidFill>
-                <a:latin typeface="+mn-lt"/>
-                <a:ea typeface="+mn-ea"/>
-                <a:cs typeface="+mn-cs"/>
-              </a:defRPr>
-            </a:lvl9pPr>
-          </a:lstStyle>
-          <a:p>
-            <a:pPr algn="just">
-              <a:lnSpc>
-                <a:spcPct val="110000"/>
-              </a:lnSpc>
-            </a:pPr>
-            <a:r>
-              <a:rPr lang="en-US" dirty="0"/>
-              <a:t>Different layers (Business, Data, Data access and library-system (UI)) of Library management system communicates with each other through function calls. Each layer interacts with the other through different techniques like Inheritance, Association, Composition etc. System data can be only accessed through UI.</a:t>
-            </a:r>
-          </a:p>
-          <a:p>
-            <a:pPr algn="just">
-              <a:lnSpc>
-                <a:spcPct val="110000"/>
-              </a:lnSpc>
-              <a:buClr>
-                <a:srgbClr val="0070C0"/>
-              </a:buClr>
-            </a:pPr>
-            <a:r>
-              <a:rPr lang="en-US" dirty="0"/>
-              <a:t>In Unity Consciousness, one feels intimately associated with all other things in creation as a result of perceiving all things in terms of one’s Self. The unified field can only be accessed through Transcendental Consciousness.</a:t>
-            </a:r>
-          </a:p>
-        </p:txBody>
-      </p:sp>
-    </p:spTree>
-    <p:extLst>
-      <p:ext uri="{BB962C8B-B14F-4D97-AF65-F5344CB8AC3E}">
-        <p14:creationId xmlns:p14="http://schemas.microsoft.com/office/powerpoint/2010/main" val="1158721665"/>
-      </p:ext>
-    </p:extLst>
-  </p:cSld>
-  <p:clrMapOvr>
-    <a:masterClrMapping/>
-  </p:clrMapOvr>
-  <p:timing>
-    <p:tnLst>
-      <p:par>
-        <p:cTn id="1" dur="indefinite" restart="never" nodeType="tmRoot"/>
-      </p:par>
-    </p:tnLst>
-  </p:timing>
-</p:sld>
-</file>
-
-<file path=ppt/slides/slide6.xml><?xml version="1.0" encoding="utf-8"?>
-<p:sld xmlns:a="http://schemas.openxmlformats.org/drawingml/2006/main" xmlns:r="http://schemas.openxmlformats.org/officeDocument/2006/relationships" xmlns:p="http://schemas.openxmlformats.org/presentationml/2006/main">
-  <p:cSld>
-    <p:spTree>
-      <p:nvGrpSpPr>
-        <p:cNvPr id="1" name=""/>
-        <p:cNvGrpSpPr/>
-        <p:nvPr/>
-      </p:nvGrpSpPr>
-      <p:grpSpPr>
-        <a:xfrm>
-          <a:off x="0" y="0"/>
-          <a:ext cx="0" cy="0"/>
-          <a:chOff x="0" y="0"/>
-          <a:chExt cx="0" cy="0"/>
-        </a:xfrm>
-      </p:grpSpPr>
-      <p:sp>
-        <p:nvSpPr>
-          <p:cNvPr id="2" name="Title 1"/>
-          <p:cNvSpPr>
-            <a:spLocks noGrp="1"/>
-          </p:cNvSpPr>
-          <p:nvPr>
-            <p:ph type="title"/>
-          </p:nvPr>
-        </p:nvSpPr>
-        <p:spPr>
-          <a:xfrm>
-            <a:off x="663485" y="2542269"/>
-            <a:ext cx="7886700" cy="1325563"/>
-          </a:xfrm>
-        </p:spPr>
-        <p:txBody>
-          <a:bodyPr/>
-          <a:lstStyle/>
-          <a:p>
-            <a:pPr algn="ctr"/>
-            <a:r>
-              <a:rPr lang="en-US" b="1" dirty="0" smtClean="0"/>
-              <a:t>Thank You!</a:t>
-            </a:r>
-            <a:endParaRPr lang="en-US" b="1" dirty="0"/>
-          </a:p>
-        </p:txBody>
-      </p:sp>
-    </p:spTree>
-    <p:extLst>
-      <p:ext uri="{BB962C8B-B14F-4D97-AF65-F5344CB8AC3E}">
-        <p14:creationId xmlns:p14="http://schemas.microsoft.com/office/powerpoint/2010/main" val="3788890314"/>
       </p:ext>
     </p:extLst>
   </p:cSld>

</xml_diff>

<commit_message>
Project Documentation completed and uploaded.
</commit_message>
<xml_diff>
--- a/doc/Presentation File.pptx
+++ b/doc/Presentation File.pptx
@@ -15,7 +15,8 @@
     <p:sldId id="259" r:id="rId9"/>
     <p:sldId id="260" r:id="rId10"/>
     <p:sldId id="257" r:id="rId11"/>
-    <p:sldId id="258" r:id="rId12"/>
+    <p:sldId id="268" r:id="rId12"/>
+    <p:sldId id="258" r:id="rId13"/>
   </p:sldIdLst>
   <p:sldSz cx="9144000" cy="6858000" type="screen4x3"/>
   <p:notesSz cx="6858000" cy="9144000"/>
@@ -3039,25 +3040,7 @@
                 </a:solidFill>
                 <a:latin typeface="Arial Black" panose="020B0A04020102020204" pitchFamily="34" charset="0"/>
               </a:rPr>
-              <a:t>Project </a:t>
-            </a:r>
-            <a:r>
-              <a:rPr lang="en-US" sz="2800" b="1" dirty="0" smtClean="0">
-                <a:solidFill>
-                  <a:srgbClr val="000000"/>
-                </a:solidFill>
-                <a:latin typeface="Arial Black" panose="020B0A04020102020204" pitchFamily="34" charset="0"/>
-              </a:rPr>
-              <a:t>: </a:t>
-            </a:r>
-            <a:r>
-              <a:rPr lang="en-US" sz="2800" b="1" dirty="0" smtClean="0">
-                <a:solidFill>
-                  <a:srgbClr val="000000"/>
-                </a:solidFill>
-                <a:latin typeface="Arial Black" panose="020B0A04020102020204" pitchFamily="34" charset="0"/>
-              </a:rPr>
-              <a:t>Library Management System</a:t>
+              <a:t>Project : Library Management System</a:t>
             </a:r>
             <a:r>
               <a:rPr lang="en-US" sz="2400" b="1" dirty="0" smtClean="0">
@@ -3954,6 +3937,196 @@
       </p:grpSpPr>
       <p:sp>
         <p:nvSpPr>
+          <p:cNvPr id="3" name="Content Placeholder 2"/>
+          <p:cNvSpPr>
+            <a:spLocks noGrp="1"/>
+          </p:cNvSpPr>
+          <p:nvPr>
+            <p:ph idx="1"/>
+          </p:nvPr>
+        </p:nvSpPr>
+        <p:spPr>
+          <a:xfrm>
+            <a:off x="1951537" y="3819888"/>
+            <a:ext cx="4963069" cy="412477"/>
+          </a:xfrm>
+        </p:spPr>
+        <p:txBody>
+          <a:bodyPr/>
+          <a:lstStyle/>
+          <a:p>
+            <a:pPr marL="0" indent="0">
+              <a:buNone/>
+            </a:pPr>
+            <a:r>
+              <a:rPr lang="en-US" dirty="0">
+                <a:solidFill>
+                  <a:schemeClr val="accent1">
+                    <a:lumMod val="75000"/>
+                  </a:schemeClr>
+                </a:solidFill>
+              </a:rPr>
+              <a:t>https://github.com/vijay9711/MPP_Project</a:t>
+            </a:r>
+          </a:p>
+        </p:txBody>
+      </p:sp>
+      <p:sp>
+        <p:nvSpPr>
+          <p:cNvPr id="4" name="Title 1"/>
+          <p:cNvSpPr txBox="1">
+            <a:spLocks/>
+          </p:cNvSpPr>
+          <p:nvPr/>
+        </p:nvSpPr>
+        <p:spPr>
+          <a:xfrm>
+            <a:off x="628650" y="164828"/>
+            <a:ext cx="7886700" cy="845365"/>
+          </a:xfrm>
+          <a:prstGeom prst="rect">
+            <a:avLst/>
+          </a:prstGeom>
+        </p:spPr>
+        <p:txBody>
+          <a:bodyPr vert="horz" lIns="91440" tIns="45720" rIns="91440" bIns="45720" rtlCol="0" anchor="ctr">
+            <a:normAutofit fontScale="90000" lnSpcReduction="10000"/>
+          </a:bodyPr>
+          <a:lstStyle>
+            <a:lvl1pPr algn="l" defTabSz="685800" rtl="0" eaLnBrk="1" latinLnBrk="0" hangingPunct="1">
+              <a:lnSpc>
+                <a:spcPct val="90000"/>
+              </a:lnSpc>
+              <a:spcBef>
+                <a:spcPct val="0"/>
+              </a:spcBef>
+              <a:buNone/>
+              <a:defRPr sz="3300" kern="1200">
+                <a:solidFill>
+                  <a:schemeClr val="tx1"/>
+                </a:solidFill>
+                <a:latin typeface="+mj-lt"/>
+                <a:ea typeface="+mj-ea"/>
+                <a:cs typeface="+mj-cs"/>
+              </a:defRPr>
+            </a:lvl1pPr>
+          </a:lstStyle>
+          <a:p>
+            <a:pPr>
+              <a:lnSpc>
+                <a:spcPct val="120000"/>
+              </a:lnSpc>
+            </a:pPr>
+            <a:r>
+              <a:rPr lang="en-US" sz="1800" b="1" dirty="0">
+                <a:solidFill>
+                  <a:schemeClr val="accent5"/>
+                </a:solidFill>
+                <a:latin typeface="Times New Roman" panose="02020603050405020304" pitchFamily="18" charset="0"/>
+                <a:cs typeface="Times New Roman" panose="02020603050405020304" pitchFamily="18" charset="0"/>
+              </a:rPr>
+              <a:t>[Repository] </a:t>
+            </a:r>
+            <a:endParaRPr lang="en-US" sz="1800" b="1" dirty="0" smtClean="0">
+              <a:solidFill>
+                <a:schemeClr val="accent5"/>
+              </a:solidFill>
+              <a:latin typeface="Times New Roman" panose="02020603050405020304" pitchFamily="18" charset="0"/>
+              <a:cs typeface="Times New Roman" panose="02020603050405020304" pitchFamily="18" charset="0"/>
+            </a:endParaRPr>
+          </a:p>
+          <a:p>
+            <a:pPr>
+              <a:lnSpc>
+                <a:spcPct val="120000"/>
+              </a:lnSpc>
+            </a:pPr>
+            <a:r>
+              <a:rPr lang="en-US" sz="2900" b="1" dirty="0" err="1">
+                <a:latin typeface="Times New Roman" panose="02020603050405020304" pitchFamily="18" charset="0"/>
+                <a:cs typeface="Times New Roman" panose="02020603050405020304" pitchFamily="18" charset="0"/>
+              </a:rPr>
+              <a:t>Github</a:t>
+            </a:r>
+            <a:r>
+              <a:rPr lang="en-US" sz="2900" b="1" dirty="0">
+                <a:latin typeface="Times New Roman" panose="02020603050405020304" pitchFamily="18" charset="0"/>
+                <a:cs typeface="Times New Roman" panose="02020603050405020304" pitchFamily="18" charset="0"/>
+              </a:rPr>
+              <a:t> </a:t>
+            </a:r>
+            <a:r>
+              <a:rPr lang="en-US" sz="2900" b="1" dirty="0">
+                <a:latin typeface="Times New Roman" panose="02020603050405020304" pitchFamily="18" charset="0"/>
+                <a:cs typeface="Times New Roman" panose="02020603050405020304" pitchFamily="18" charset="0"/>
+              </a:rPr>
+              <a:t>Link</a:t>
+            </a:r>
+          </a:p>
+        </p:txBody>
+      </p:sp>
+      <p:pic>
+        <p:nvPicPr>
+          <p:cNvPr id="5" name="Picture 4"/>
+          <p:cNvPicPr>
+            <a:picLocks noChangeAspect="1"/>
+          </p:cNvPicPr>
+          <p:nvPr/>
+        </p:nvPicPr>
+        <p:blipFill>
+          <a:blip r:embed="rId2" cstate="print">
+            <a:extLst>
+              <a:ext uri="{28A0092B-C50C-407E-A947-70E740481C1C}">
+                <a14:useLocalDpi xmlns:a14="http://schemas.microsoft.com/office/drawing/2010/main" val="0"/>
+              </a:ext>
+            </a:extLst>
+          </a:blip>
+          <a:stretch>
+            <a:fillRect/>
+          </a:stretch>
+        </p:blipFill>
+        <p:spPr>
+          <a:xfrm>
+            <a:off x="3218225" y="2270308"/>
+            <a:ext cx="2429691" cy="1366701"/>
+          </a:xfrm>
+          <a:prstGeom prst="rect">
+            <a:avLst/>
+          </a:prstGeom>
+        </p:spPr>
+      </p:pic>
+    </p:spTree>
+    <p:extLst>
+      <p:ext uri="{BB962C8B-B14F-4D97-AF65-F5344CB8AC3E}">
+        <p14:creationId xmlns:p14="http://schemas.microsoft.com/office/powerpoint/2010/main" val="2161113630"/>
+      </p:ext>
+    </p:extLst>
+  </p:cSld>
+  <p:clrMapOvr>
+    <a:masterClrMapping/>
+  </p:clrMapOvr>
+</p:sld>
+</file>
+
+<file path=ppt/slides/slide12.xml><?xml version="1.0" encoding="utf-8"?>
+<p:sld xmlns:a="http://schemas.openxmlformats.org/drawingml/2006/main" xmlns:r="http://schemas.openxmlformats.org/officeDocument/2006/relationships" xmlns:p="http://schemas.openxmlformats.org/presentationml/2006/main">
+  <p:cSld>
+    <p:spTree>
+      <p:nvGrpSpPr>
+        <p:cNvPr id="1" name=""/>
+        <p:cNvGrpSpPr/>
+        <p:nvPr/>
+      </p:nvGrpSpPr>
+      <p:grpSpPr>
+        <a:xfrm>
+          <a:off x="0" y="0"/>
+          <a:ext cx="0" cy="0"/>
+          <a:chOff x="0" y="0"/>
+          <a:chExt cx="0" cy="0"/>
+        </a:xfrm>
+      </p:grpSpPr>
+      <p:sp>
+        <p:nvSpPr>
           <p:cNvPr id="2" name="Title 1"/>
           <p:cNvSpPr>
             <a:spLocks noGrp="1"/>
@@ -4557,15 +4730,48 @@
                 <a:latin typeface="Times New Roman" panose="02020603050405020304" pitchFamily="18" charset="0"/>
                 <a:cs typeface="Times New Roman" panose="02020603050405020304" pitchFamily="18" charset="0"/>
               </a:rPr>
-              <a:t>Populating overdue publication list</a:t>
-            </a:r>
-            <a:endParaRPr lang="en-US" sz="2000" b="1" dirty="0" smtClean="0">
-              <a:solidFill>
-                <a:schemeClr val="accent5"/>
-              </a:solidFill>
-              <a:latin typeface="Times New Roman" panose="02020603050405020304" pitchFamily="18" charset="0"/>
-              <a:cs typeface="Times New Roman" panose="02020603050405020304" pitchFamily="18" charset="0"/>
-            </a:endParaRPr>
+              <a:t>Populating overdue publication </a:t>
+            </a:r>
+            <a:r>
+              <a:rPr lang="en-US" sz="2000" b="1" dirty="0" smtClean="0">
+                <a:latin typeface="Times New Roman" panose="02020603050405020304" pitchFamily="18" charset="0"/>
+                <a:cs typeface="Times New Roman" panose="02020603050405020304" pitchFamily="18" charset="0"/>
+              </a:rPr>
+              <a:t>list</a:t>
+            </a:r>
+          </a:p>
+          <a:p>
+            <a:pPr>
+              <a:buClr>
+                <a:schemeClr val="accent1">
+                  <a:lumMod val="75000"/>
+                </a:schemeClr>
+              </a:buClr>
+            </a:pPr>
+            <a:r>
+              <a:rPr lang="en-US" sz="2000" b="1" dirty="0" smtClean="0">
+                <a:solidFill>
+                  <a:schemeClr val="accent5"/>
+                </a:solidFill>
+                <a:latin typeface="Times New Roman" panose="02020603050405020304" pitchFamily="18" charset="0"/>
+                <a:cs typeface="Times New Roman" panose="02020603050405020304" pitchFamily="18" charset="0"/>
+              </a:rPr>
+              <a:t>[Repository] – </a:t>
+            </a:r>
+            <a:r>
+              <a:rPr lang="en-US" sz="2000" b="1" dirty="0" err="1">
+                <a:latin typeface="Times New Roman" panose="02020603050405020304" pitchFamily="18" charset="0"/>
+                <a:cs typeface="Times New Roman" panose="02020603050405020304" pitchFamily="18" charset="0"/>
+              </a:rPr>
+              <a:t>Github</a:t>
+            </a:r>
+            <a:r>
+              <a:rPr lang="en-US" sz="2000" b="1" dirty="0">
+                <a:latin typeface="Times New Roman" panose="02020603050405020304" pitchFamily="18" charset="0"/>
+                <a:cs typeface="Times New Roman" panose="02020603050405020304" pitchFamily="18" charset="0"/>
+              </a:rPr>
+              <a:t> Link</a:t>
+            </a:r>
           </a:p>
           <a:p>
             <a:pPr>
@@ -4739,7 +4945,7 @@
       </p:sp>
       <p:pic>
         <p:nvPicPr>
-          <p:cNvPr id="7" name="Picture 6"/>
+          <p:cNvPr id="2" name="Picture 1"/>
           <p:cNvPicPr>
             <a:picLocks noChangeAspect="1"/>
           </p:cNvPicPr>
@@ -4753,8 +4959,8 @@
         </p:blipFill>
         <p:spPr>
           <a:xfrm>
-            <a:off x="994040" y="1142887"/>
-            <a:ext cx="5685434" cy="5331936"/>
+            <a:off x="1693706" y="1171189"/>
+            <a:ext cx="5630203" cy="5521348"/>
           </a:xfrm>
           <a:prstGeom prst="rect">
             <a:avLst/>
@@ -4870,6 +5076,30 @@
           </a:p>
         </p:txBody>
       </p:sp>
+      <p:pic>
+        <p:nvPicPr>
+          <p:cNvPr id="2" name="Picture 1"/>
+          <p:cNvPicPr>
+            <a:picLocks noChangeAspect="1"/>
+          </p:cNvPicPr>
+          <p:nvPr/>
+        </p:nvPicPr>
+        <p:blipFill>
+          <a:blip r:embed="rId2"/>
+          <a:stretch>
+            <a:fillRect/>
+          </a:stretch>
+        </p:blipFill>
+        <p:spPr>
+          <a:xfrm>
+            <a:off x="374468" y="928937"/>
+            <a:ext cx="8395063" cy="5795858"/>
+          </a:xfrm>
+          <a:prstGeom prst="rect">
+            <a:avLst/>
+          </a:prstGeom>
+        </p:spPr>
+      </p:pic>
     </p:spTree>
     <p:extLst>
       <p:ext uri="{BB962C8B-B14F-4D97-AF65-F5344CB8AC3E}">
@@ -5921,8 +6151,9 @@
             </a:r>
             <a:r>
               <a:rPr lang="en-US" dirty="0" smtClean="0"/>
-              <a:t>At least 10 Digit</a:t>
-            </a:r>
+              <a:t>Not Blank</a:t>
+            </a:r>
+            <a:endParaRPr lang="en-US" dirty="0" smtClean="0"/>
           </a:p>
           <a:p>
             <a:pPr lvl="1" algn="just">

</xml_diff>